<commit_message>
Added more data; Client web updated; etc.
</commit_message>
<xml_diff>
--- a/docs/documents/weekly_meeting/Week 10.pptx
+++ b/docs/documents/weekly_meeting/Week 10.pptx
@@ -5,24 +5,26 @@
     <p:sldMasterId id="2147483648" r:id="rId1"/>
   </p:sldMasterIdLst>
   <p:notesMasterIdLst>
-    <p:notesMasterId r:id="rId17"/>
+    <p:notesMasterId r:id="rId19"/>
   </p:notesMasterIdLst>
   <p:sldIdLst>
     <p:sldId id="257" r:id="rId2"/>
     <p:sldId id="258" r:id="rId3"/>
     <p:sldId id="262" r:id="rId4"/>
     <p:sldId id="264" r:id="rId5"/>
-    <p:sldId id="265" r:id="rId6"/>
-    <p:sldId id="268" r:id="rId7"/>
-    <p:sldId id="269" r:id="rId8"/>
-    <p:sldId id="270" r:id="rId9"/>
-    <p:sldId id="266" r:id="rId10"/>
-    <p:sldId id="267" r:id="rId11"/>
-    <p:sldId id="272" r:id="rId12"/>
-    <p:sldId id="271" r:id="rId13"/>
-    <p:sldId id="274" r:id="rId14"/>
-    <p:sldId id="275" r:id="rId15"/>
-    <p:sldId id="261" r:id="rId16"/>
+    <p:sldId id="277" r:id="rId6"/>
+    <p:sldId id="265" r:id="rId7"/>
+    <p:sldId id="268" r:id="rId8"/>
+    <p:sldId id="269" r:id="rId9"/>
+    <p:sldId id="270" r:id="rId10"/>
+    <p:sldId id="266" r:id="rId11"/>
+    <p:sldId id="267" r:id="rId12"/>
+    <p:sldId id="272" r:id="rId13"/>
+    <p:sldId id="276" r:id="rId14"/>
+    <p:sldId id="271" r:id="rId15"/>
+    <p:sldId id="274" r:id="rId16"/>
+    <p:sldId id="275" r:id="rId17"/>
+    <p:sldId id="261" r:id="rId18"/>
   </p:sldIdLst>
   <p:sldSz cx="12192000" cy="6858000"/>
   <p:notesSz cx="6858000" cy="9144000"/>
@@ -211,7 +213,7 @@
           <a:p>
             <a:fld id="{2B443DB1-3454-AB4E-A2F7-083942AD4ADB}" type="datetimeFigureOut">
               <a:rPr lang="en-US" smtClean="0"/>
-              <a:t>10/17/16</a:t>
+              <a:t>10/20/16</a:t>
             </a:fld>
             <a:endParaRPr lang="en-US"/>
           </a:p>
@@ -751,7 +753,7 @@
           <a:p>
             <a:fld id="{2743912D-219C-6C43-ACEF-0C2D0D6A3A01}" type="slidenum">
               <a:rPr lang="en-US" smtClean="0"/>
-              <a:t>10</a:t>
+              <a:t>11</a:t>
             </a:fld>
             <a:endParaRPr lang="en-US"/>
           </a:p>
@@ -835,7 +837,7 @@
           <a:p>
             <a:fld id="{2743912D-219C-6C43-ACEF-0C2D0D6A3A01}" type="slidenum">
               <a:rPr lang="en-US" smtClean="0"/>
-              <a:t>11</a:t>
+              <a:t>12</a:t>
             </a:fld>
             <a:endParaRPr lang="en-US"/>
           </a:p>
@@ -919,7 +921,7 @@
           <a:p>
             <a:fld id="{2743912D-219C-6C43-ACEF-0C2D0D6A3A01}" type="slidenum">
               <a:rPr lang="en-US" smtClean="0"/>
-              <a:t>12</a:t>
+              <a:t>14</a:t>
             </a:fld>
             <a:endParaRPr lang="en-US"/>
           </a:p>
@@ -1003,7 +1005,7 @@
           <a:p>
             <a:fld id="{2743912D-219C-6C43-ACEF-0C2D0D6A3A01}" type="slidenum">
               <a:rPr lang="en-US" smtClean="0"/>
-              <a:t>13</a:t>
+              <a:t>15</a:t>
             </a:fld>
             <a:endParaRPr lang="en-US"/>
           </a:p>
@@ -1153,7 +1155,7 @@
           <a:p>
             <a:fld id="{AC020E75-F84B-F342-8F11-D007000D2CC1}" type="datetimeFigureOut">
               <a:rPr lang="en-US" smtClean="0"/>
-              <a:t>10/17/16</a:t>
+              <a:t>10/20/16</a:t>
             </a:fld>
             <a:endParaRPr lang="en-US"/>
           </a:p>
@@ -1323,7 +1325,7 @@
           <a:p>
             <a:fld id="{AC020E75-F84B-F342-8F11-D007000D2CC1}" type="datetimeFigureOut">
               <a:rPr lang="en-US" smtClean="0"/>
-              <a:t>10/17/16</a:t>
+              <a:t>10/20/16</a:t>
             </a:fld>
             <a:endParaRPr lang="en-US"/>
           </a:p>
@@ -1503,7 +1505,7 @@
           <a:p>
             <a:fld id="{AC020E75-F84B-F342-8F11-D007000D2CC1}" type="datetimeFigureOut">
               <a:rPr lang="en-US" smtClean="0"/>
-              <a:t>10/17/16</a:t>
+              <a:t>10/20/16</a:t>
             </a:fld>
             <a:endParaRPr lang="en-US"/>
           </a:p>
@@ -1673,7 +1675,7 @@
           <a:p>
             <a:fld id="{AC020E75-F84B-F342-8F11-D007000D2CC1}" type="datetimeFigureOut">
               <a:rPr lang="en-US" smtClean="0"/>
-              <a:t>10/17/16</a:t>
+              <a:t>10/20/16</a:t>
             </a:fld>
             <a:endParaRPr lang="en-US"/>
           </a:p>
@@ -1919,7 +1921,7 @@
           <a:p>
             <a:fld id="{AC020E75-F84B-F342-8F11-D007000D2CC1}" type="datetimeFigureOut">
               <a:rPr lang="en-US" smtClean="0"/>
-              <a:t>10/17/16</a:t>
+              <a:t>10/20/16</a:t>
             </a:fld>
             <a:endParaRPr lang="en-US"/>
           </a:p>
@@ -2151,7 +2153,7 @@
           <a:p>
             <a:fld id="{AC020E75-F84B-F342-8F11-D007000D2CC1}" type="datetimeFigureOut">
               <a:rPr lang="en-US" smtClean="0"/>
-              <a:t>10/17/16</a:t>
+              <a:t>10/20/16</a:t>
             </a:fld>
             <a:endParaRPr lang="en-US"/>
           </a:p>
@@ -2518,7 +2520,7 @@
           <a:p>
             <a:fld id="{AC020E75-F84B-F342-8F11-D007000D2CC1}" type="datetimeFigureOut">
               <a:rPr lang="en-US" smtClean="0"/>
-              <a:t>10/17/16</a:t>
+              <a:t>10/20/16</a:t>
             </a:fld>
             <a:endParaRPr lang="en-US"/>
           </a:p>
@@ -2636,7 +2638,7 @@
           <a:p>
             <a:fld id="{AC020E75-F84B-F342-8F11-D007000D2CC1}" type="datetimeFigureOut">
               <a:rPr lang="en-US" smtClean="0"/>
-              <a:t>10/17/16</a:t>
+              <a:t>10/20/16</a:t>
             </a:fld>
             <a:endParaRPr lang="en-US"/>
           </a:p>
@@ -2731,7 +2733,7 @@
           <a:p>
             <a:fld id="{AC020E75-F84B-F342-8F11-D007000D2CC1}" type="datetimeFigureOut">
               <a:rPr lang="en-US" smtClean="0"/>
-              <a:t>10/17/16</a:t>
+              <a:t>10/20/16</a:t>
             </a:fld>
             <a:endParaRPr lang="en-US"/>
           </a:p>
@@ -3008,7 +3010,7 @@
           <a:p>
             <a:fld id="{AC020E75-F84B-F342-8F11-D007000D2CC1}" type="datetimeFigureOut">
               <a:rPr lang="en-US" smtClean="0"/>
-              <a:t>10/17/16</a:t>
+              <a:t>10/20/16</a:t>
             </a:fld>
             <a:endParaRPr lang="en-US"/>
           </a:p>
@@ -3261,7 +3263,7 @@
           <a:p>
             <a:fld id="{AC020E75-F84B-F342-8F11-D007000D2CC1}" type="datetimeFigureOut">
               <a:rPr lang="en-US" smtClean="0"/>
-              <a:t>10/17/16</a:t>
+              <a:t>10/20/16</a:t>
             </a:fld>
             <a:endParaRPr lang="en-US"/>
           </a:p>
@@ -3474,7 +3476,7 @@
           <a:p>
             <a:fld id="{AC020E75-F84B-F342-8F11-D007000D2CC1}" type="datetimeFigureOut">
               <a:rPr lang="en-US" smtClean="0"/>
-              <a:t>10/17/16</a:t>
+              <a:t>10/20/16</a:t>
             </a:fld>
             <a:endParaRPr lang="en-US"/>
           </a:p>
@@ -4006,11 +4008,7 @@
           <a:p>
             <a:r>
               <a:rPr lang="en-US" b="1" dirty="0" smtClean="0"/>
-              <a:t>Random </a:t>
-            </a:r>
-            <a:r>
-              <a:rPr lang="en-US" b="1" dirty="0" smtClean="0"/>
-              <a:t>Forest</a:t>
+              <a:t>Results</a:t>
             </a:r>
             <a:endParaRPr lang="en-US" b="1" dirty="0"/>
           </a:p>
@@ -4018,7 +4016,7 @@
       </p:sp>
       <p:sp>
         <p:nvSpPr>
-          <p:cNvPr id="5" name="Content Placeholder 4"/>
+          <p:cNvPr id="3" name="Content Placeholder 2"/>
           <p:cNvSpPr>
             <a:spLocks noGrp="1"/>
           </p:cNvSpPr>
@@ -4032,420 +4030,52 @@
           <a:lstStyle/>
           <a:p>
             <a:r>
-              <a:rPr lang="en-US" b="1" dirty="0" smtClean="0"/>
-              <a:t>Number of estimators =</a:t>
-            </a:r>
-            <a:r>
-              <a:rPr lang="en-US" dirty="0" smtClean="0"/>
-              <a:t> 10</a:t>
-            </a:r>
-          </a:p>
-          <a:p>
-            <a:endParaRPr lang="en-US" dirty="0"/>
-          </a:p>
-          <a:p>
-            <a:endParaRPr lang="en-US" dirty="0" smtClean="0"/>
-          </a:p>
-          <a:p>
-            <a:endParaRPr lang="en-US" dirty="0"/>
-          </a:p>
-          <a:p>
-            <a:endParaRPr lang="en-US" dirty="0" smtClean="0"/>
-          </a:p>
-          <a:p>
-            <a:endParaRPr lang="en-US" dirty="0"/>
-          </a:p>
-          <a:p>
-            <a:r>
-              <a:rPr lang="en-US" u="sng" dirty="0" smtClean="0"/>
-              <a:t>The bigger the window size, the better it is!</a:t>
-            </a:r>
-          </a:p>
-          <a:p>
-            <a:endParaRPr lang="en-US" dirty="0" smtClean="0"/>
-          </a:p>
-        </p:txBody>
-      </p:sp>
-      <p:graphicFrame>
-        <p:nvGraphicFramePr>
-          <p:cNvPr id="6" name="Table 5"/>
-          <p:cNvGraphicFramePr>
-            <a:graphicFrameLocks noGrp="1"/>
-          </p:cNvGraphicFramePr>
-          <p:nvPr>
-            <p:extLst>
-              <p:ext uri="{D42A27DB-BD31-4B8C-83A1-F6EECF244321}">
-                <p14:modId xmlns:p14="http://schemas.microsoft.com/office/powerpoint/2010/main" val="83406797"/>
-              </p:ext>
-            </p:extLst>
-          </p:nvPr>
-        </p:nvGraphicFramePr>
-        <p:xfrm>
-          <a:off x="1117600" y="2460784"/>
-          <a:ext cx="10236201" cy="2194560"/>
-        </p:xfrm>
-        <a:graphic>
-          <a:graphicData uri="http://schemas.openxmlformats.org/drawingml/2006/table">
-            <a:tbl>
-              <a:tblPr firstRow="1" bandRow="1">
-                <a:tableStyleId>{5C22544A-7EE6-4342-B048-85BDC9FD1C3A}</a:tableStyleId>
-              </a:tblPr>
-              <a:tblGrid>
-                <a:gridCol w="2157940"/>
-                <a:gridCol w="1542240"/>
-                <a:gridCol w="2131371"/>
-                <a:gridCol w="2202325"/>
-                <a:gridCol w="2202325"/>
-              </a:tblGrid>
-              <a:tr h="370840">
-                <a:tc>
-                  <a:txBody>
-                    <a:bodyPr/>
-                    <a:lstStyle/>
-                    <a:p>
-                      <a:pPr algn="ctr"/>
-                      <a:r>
-                        <a:rPr lang="en-US" sz="2400" dirty="0" smtClean="0"/>
-                        <a:t>Sampling</a:t>
-                      </a:r>
-                      <a:r>
-                        <a:rPr lang="en-US" sz="2400" baseline="0" dirty="0" smtClean="0"/>
-                        <a:t> Frequency</a:t>
-                      </a:r>
-                      <a:endParaRPr lang="en-US" sz="2400" dirty="0"/>
-                    </a:p>
-                  </a:txBody>
-                  <a:tcPr/>
-                </a:tc>
-                <a:tc>
-                  <a:txBody>
-                    <a:bodyPr/>
-                    <a:lstStyle/>
-                    <a:p>
-                      <a:pPr algn="ctr"/>
-                      <a:r>
-                        <a:rPr lang="en-US" sz="2400" dirty="0" smtClean="0"/>
-                        <a:t>Window</a:t>
-                      </a:r>
-                      <a:r>
-                        <a:rPr lang="en-US" sz="2400" baseline="0" dirty="0" smtClean="0"/>
-                        <a:t> Size</a:t>
-                      </a:r>
-                      <a:endParaRPr lang="en-US" sz="2400" dirty="0"/>
-                    </a:p>
-                  </a:txBody>
-                  <a:tcPr/>
-                </a:tc>
-                <a:tc>
-                  <a:txBody>
-                    <a:bodyPr/>
-                    <a:lstStyle/>
-                    <a:p>
-                      <a:pPr algn="ctr"/>
-                      <a:r>
-                        <a:rPr lang="en-US" sz="2400" dirty="0" smtClean="0"/>
-                        <a:t>Accurac</a:t>
-                      </a:r>
-                      <a:r>
-                        <a:rPr lang="en-US" sz="2400" baseline="0" dirty="0" smtClean="0"/>
-                        <a:t>y Mean </a:t>
-                      </a:r>
-                    </a:p>
-                    <a:p>
-                      <a:pPr algn="ctr"/>
-                      <a:r>
-                        <a:rPr lang="en-US" sz="2400" baseline="0" dirty="0" smtClean="0"/>
-                        <a:t>(SP + SW)</a:t>
-                      </a:r>
-                      <a:endParaRPr lang="en-US" sz="2400" dirty="0"/>
-                    </a:p>
-                  </a:txBody>
-                  <a:tcPr/>
-                </a:tc>
-                <a:tc>
-                  <a:txBody>
-                    <a:bodyPr/>
-                    <a:lstStyle/>
-                    <a:p>
-                      <a:pPr algn="ctr"/>
-                      <a:r>
-                        <a:rPr lang="en-US" sz="2400" dirty="0" smtClean="0"/>
-                        <a:t>Accuracy Mean </a:t>
-                      </a:r>
-                    </a:p>
-                    <a:p>
-                      <a:pPr algn="ctr"/>
-                      <a:r>
-                        <a:rPr lang="en-US" sz="2400" dirty="0" smtClean="0"/>
-                        <a:t>(SP)</a:t>
-                      </a:r>
-                      <a:endParaRPr lang="en-US" sz="2400" dirty="0"/>
-                    </a:p>
-                  </a:txBody>
-                  <a:tcPr/>
-                </a:tc>
-                <a:tc>
-                  <a:txBody>
-                    <a:bodyPr/>
-                    <a:lstStyle/>
-                    <a:p>
-                      <a:pPr algn="ctr"/>
-                      <a:r>
-                        <a:rPr lang="en-US" sz="2400" dirty="0" smtClean="0"/>
-                        <a:t>Accuracy Mean</a:t>
-                      </a:r>
-                    </a:p>
-                    <a:p>
-                      <a:pPr algn="ctr"/>
-                      <a:r>
-                        <a:rPr lang="en-US" sz="2400" dirty="0" smtClean="0"/>
-                        <a:t>(SW)</a:t>
-                      </a:r>
-                      <a:endParaRPr lang="en-US" sz="2400" dirty="0"/>
-                    </a:p>
-                  </a:txBody>
-                  <a:tcPr/>
-                </a:tc>
-              </a:tr>
-              <a:tr h="370840">
-                <a:tc>
-                  <a:txBody>
-                    <a:bodyPr/>
-                    <a:lstStyle/>
-                    <a:p>
-                      <a:r>
-                        <a:rPr lang="en-US" sz="2400" dirty="0" smtClean="0"/>
-                        <a:t>10 Hz</a:t>
-                      </a:r>
-                      <a:endParaRPr lang="en-US" sz="2400" dirty="0"/>
-                    </a:p>
-                  </a:txBody>
-                  <a:tcPr/>
-                </a:tc>
-                <a:tc>
-                  <a:txBody>
-                    <a:bodyPr/>
-                    <a:lstStyle/>
-                    <a:p>
-                      <a:r>
-                        <a:rPr lang="en-US" sz="2400" dirty="0" smtClean="0"/>
-                        <a:t>1 second</a:t>
-                      </a:r>
-                      <a:endParaRPr lang="en-US" sz="2400" dirty="0"/>
-                    </a:p>
-                  </a:txBody>
-                  <a:tcPr/>
-                </a:tc>
-                <a:tc>
-                  <a:txBody>
-                    <a:bodyPr/>
-                    <a:lstStyle/>
-                    <a:p>
-                      <a:pPr algn="ctr"/>
-                      <a:r>
-                        <a:rPr lang="en-US" sz="2400" dirty="0" smtClean="0"/>
-                        <a:t>95.53%</a:t>
-                      </a:r>
-                      <a:endParaRPr lang="en-US" sz="2400" dirty="0"/>
-                    </a:p>
-                  </a:txBody>
-                  <a:tcPr/>
-                </a:tc>
-                <a:tc>
-                  <a:txBody>
-                    <a:bodyPr/>
-                    <a:lstStyle/>
-                    <a:p>
-                      <a:pPr algn="ctr"/>
-                      <a:r>
-                        <a:rPr lang="en-US" sz="2400" dirty="0" smtClean="0"/>
-                        <a:t>89.8%</a:t>
-                      </a:r>
-                      <a:endParaRPr lang="en-US" sz="2400" dirty="0"/>
-                    </a:p>
-                  </a:txBody>
-                  <a:tcPr/>
-                </a:tc>
-                <a:tc>
-                  <a:txBody>
-                    <a:bodyPr/>
-                    <a:lstStyle/>
-                    <a:p>
-                      <a:pPr algn="ctr"/>
-                      <a:r>
-                        <a:rPr lang="en-US" sz="2400" dirty="0" smtClean="0"/>
-                        <a:t>89.72%</a:t>
-                      </a:r>
-                      <a:endParaRPr lang="en-US" sz="2400" dirty="0"/>
-                    </a:p>
-                  </a:txBody>
-                  <a:tcPr/>
-                </a:tc>
-              </a:tr>
-              <a:tr h="370840">
-                <a:tc>
-                  <a:txBody>
-                    <a:bodyPr/>
-                    <a:lstStyle/>
-                    <a:p>
-                      <a:r>
-                        <a:rPr lang="en-US" sz="2400" dirty="0" smtClean="0"/>
-                        <a:t>10 Hz</a:t>
-                      </a:r>
-                      <a:endParaRPr lang="en-US" sz="2400" dirty="0"/>
-                    </a:p>
-                  </a:txBody>
-                  <a:tcPr/>
-                </a:tc>
-                <a:tc>
-                  <a:txBody>
-                    <a:bodyPr/>
-                    <a:lstStyle/>
-                    <a:p>
-                      <a:r>
-                        <a:rPr lang="en-US" sz="2400" dirty="0" smtClean="0"/>
-                        <a:t>2 seconds</a:t>
-                      </a:r>
-                      <a:endParaRPr lang="en-US" sz="2400" dirty="0"/>
-                    </a:p>
-                  </a:txBody>
-                  <a:tcPr/>
-                </a:tc>
-                <a:tc>
-                  <a:txBody>
-                    <a:bodyPr/>
-                    <a:lstStyle/>
-                    <a:p>
-                      <a:pPr algn="ctr"/>
-                      <a:r>
-                        <a:rPr lang="en-US" sz="2400" dirty="0" smtClean="0"/>
-                        <a:t>96.51%</a:t>
-                      </a:r>
-                      <a:endParaRPr lang="en-US" sz="2400" dirty="0"/>
-                    </a:p>
-                  </a:txBody>
-                  <a:tcPr/>
-                </a:tc>
-                <a:tc>
-                  <a:txBody>
-                    <a:bodyPr/>
-                    <a:lstStyle/>
-                    <a:p>
-                      <a:pPr algn="ctr"/>
-                      <a:r>
-                        <a:rPr lang="en-US" sz="2400" dirty="0" smtClean="0"/>
-                        <a:t>92%</a:t>
-                      </a:r>
-                      <a:endParaRPr lang="en-US" sz="2400" dirty="0"/>
-                    </a:p>
-                  </a:txBody>
-                  <a:tcPr/>
-                </a:tc>
-                <a:tc>
-                  <a:txBody>
-                    <a:bodyPr/>
-                    <a:lstStyle/>
-                    <a:p>
-                      <a:pPr algn="ctr"/>
-                      <a:r>
-                        <a:rPr lang="en-US" sz="2400" dirty="0" smtClean="0"/>
-                        <a:t>92.51%</a:t>
-                      </a:r>
-                      <a:endParaRPr lang="en-US" sz="2400" dirty="0"/>
-                    </a:p>
-                  </a:txBody>
-                  <a:tcPr/>
-                </a:tc>
-              </a:tr>
-              <a:tr h="370840">
-                <a:tc>
-                  <a:txBody>
-                    <a:bodyPr/>
-                    <a:lstStyle/>
-                    <a:p>
-                      <a:r>
-                        <a:rPr lang="en-US" sz="2400" dirty="0" smtClean="0"/>
-                        <a:t>10 Hz</a:t>
-                      </a:r>
-                      <a:endParaRPr lang="en-US" sz="2400" dirty="0"/>
-                    </a:p>
-                  </a:txBody>
-                  <a:tcPr/>
-                </a:tc>
-                <a:tc>
-                  <a:txBody>
-                    <a:bodyPr/>
-                    <a:lstStyle/>
-                    <a:p>
-                      <a:r>
-                        <a:rPr lang="en-US" sz="2400" dirty="0" smtClean="0"/>
-                        <a:t>3 seconds</a:t>
-                      </a:r>
-                      <a:endParaRPr lang="en-US" sz="2400" dirty="0"/>
-                    </a:p>
-                  </a:txBody>
-                  <a:tcPr/>
-                </a:tc>
-                <a:tc>
-                  <a:txBody>
-                    <a:bodyPr/>
-                    <a:lstStyle/>
-                    <a:p>
-                      <a:pPr algn="ctr"/>
-                      <a:r>
-                        <a:rPr lang="en-US" sz="2400" dirty="0" smtClean="0"/>
-                        <a:t>98.19%</a:t>
-                      </a:r>
-                      <a:endParaRPr lang="en-US" sz="2400" dirty="0"/>
-                    </a:p>
-                  </a:txBody>
-                  <a:tcPr/>
-                </a:tc>
-                <a:tc>
-                  <a:txBody>
-                    <a:bodyPr/>
-                    <a:lstStyle/>
-                    <a:p>
-                      <a:pPr algn="ctr"/>
-                      <a:r>
-                        <a:rPr lang="en-US" sz="2400" dirty="0" smtClean="0"/>
-                        <a:t>93.4%</a:t>
-                      </a:r>
-                      <a:endParaRPr lang="en-US" sz="2400" dirty="0"/>
-                    </a:p>
-                  </a:txBody>
-                  <a:tcPr/>
-                </a:tc>
-                <a:tc>
-                  <a:txBody>
-                    <a:bodyPr/>
-                    <a:lstStyle/>
-                    <a:p>
-                      <a:pPr algn="ctr"/>
-                      <a:r>
-                        <a:rPr lang="en-US" sz="2400" dirty="0" smtClean="0"/>
-                        <a:t>94.78%</a:t>
-                      </a:r>
-                      <a:endParaRPr lang="en-US" sz="2400" dirty="0"/>
-                    </a:p>
-                  </a:txBody>
-                  <a:tcPr/>
-                </a:tc>
-              </a:tr>
-            </a:tbl>
-          </a:graphicData>
-        </a:graphic>
-      </p:graphicFrame>
+              <a:rPr lang="en-US" sz="3200" b="1" dirty="0" smtClean="0"/>
+              <a:t>Experiments (</a:t>
+            </a:r>
+            <a:r>
+              <a:rPr lang="en-US" sz="3200" b="1" dirty="0" smtClean="0"/>
+              <a:t>5-folds):</a:t>
+            </a:r>
+            <a:endParaRPr lang="en-US" sz="3200" b="1" dirty="0" smtClean="0"/>
+          </a:p>
+          <a:p>
+            <a:pPr lvl="1"/>
+            <a:r>
+              <a:rPr lang="en-US" sz="2800" dirty="0" smtClean="0"/>
+              <a:t>SVM</a:t>
+            </a:r>
+          </a:p>
+          <a:p>
+            <a:pPr lvl="1"/>
+            <a:r>
+              <a:rPr lang="en-US" sz="2800" dirty="0" smtClean="0"/>
+              <a:t>Random </a:t>
+            </a:r>
+            <a:r>
+              <a:rPr lang="en-US" sz="2800" dirty="0" smtClean="0"/>
+              <a:t>Forest</a:t>
+            </a:r>
+          </a:p>
+        </p:txBody>
+      </p:sp>
     </p:spTree>
     <p:extLst>
       <p:ext uri="{BB962C8B-B14F-4D97-AF65-F5344CB8AC3E}">
-        <p14:creationId xmlns:p14="http://schemas.microsoft.com/office/powerpoint/2010/main" val="929418408"/>
+        <p14:creationId xmlns:p14="http://schemas.microsoft.com/office/powerpoint/2010/main" val="1236445860"/>
       </p:ext>
     </p:extLst>
   </p:cSld>
   <p:clrMapOvr>
     <a:masterClrMapping/>
   </p:clrMapOvr>
+  <p:timing>
+    <p:tnLst>
+      <p:par>
+        <p:cTn id="1" dur="indefinite" restart="never" nodeType="tmRoot"/>
+      </p:par>
+    </p:tnLst>
+  </p:timing>
 </p:sld>
 </file>
 
@@ -4483,11 +4113,525 @@
           <a:p>
             <a:r>
               <a:rPr lang="en-US" b="1" dirty="0" smtClean="0"/>
+              <a:t>Random Forest</a:t>
+            </a:r>
+            <a:endParaRPr lang="en-US" b="1" dirty="0"/>
+          </a:p>
+        </p:txBody>
+      </p:sp>
+      <p:sp>
+        <p:nvSpPr>
+          <p:cNvPr id="5" name="Content Placeholder 4"/>
+          <p:cNvSpPr>
+            <a:spLocks noGrp="1"/>
+          </p:cNvSpPr>
+          <p:nvPr>
+            <p:ph idx="1"/>
+          </p:nvPr>
+        </p:nvSpPr>
+        <p:spPr>
+          <a:xfrm>
+            <a:off x="838200" y="1825624"/>
+            <a:ext cx="10515600" cy="5232901"/>
+          </a:xfrm>
+        </p:spPr>
+        <p:txBody>
+          <a:bodyPr>
+            <a:normAutofit/>
+          </a:bodyPr>
+          <a:lstStyle/>
+          <a:p>
+            <a:r>
+              <a:rPr lang="en-US" b="1" dirty="0" smtClean="0"/>
+              <a:t>Number of estimators =</a:t>
+            </a:r>
+            <a:r>
+              <a:rPr lang="en-US" dirty="0" smtClean="0"/>
+              <a:t> 10</a:t>
+            </a:r>
+          </a:p>
+          <a:p>
+            <a:endParaRPr lang="en-US" dirty="0"/>
+          </a:p>
+          <a:p>
+            <a:endParaRPr lang="en-US" dirty="0" smtClean="0"/>
+          </a:p>
+          <a:p>
+            <a:endParaRPr lang="en-US" dirty="0"/>
+          </a:p>
+          <a:p>
+            <a:endParaRPr lang="en-US" dirty="0" smtClean="0"/>
+          </a:p>
+          <a:p>
+            <a:endParaRPr lang="en-US" dirty="0"/>
+          </a:p>
+          <a:p>
+            <a:r>
+              <a:rPr lang="en-US" u="sng" dirty="0" smtClean="0"/>
+              <a:t>The bigger the window size, the better it is!</a:t>
+            </a:r>
+          </a:p>
+          <a:p>
+            <a:endParaRPr lang="en-US" dirty="0" smtClean="0"/>
+          </a:p>
+          <a:p>
+            <a:pPr marL="0" indent="0">
+              <a:buNone/>
+            </a:pPr>
+            <a:r>
+              <a:rPr lang="en-US" sz="2000" b="1" dirty="0" smtClean="0"/>
+              <a:t>SP =</a:t>
+            </a:r>
+            <a:r>
+              <a:rPr lang="en-US" sz="2000" dirty="0" smtClean="0"/>
+              <a:t> Smartphone</a:t>
+            </a:r>
+          </a:p>
+          <a:p>
+            <a:pPr marL="0" indent="0">
+              <a:buNone/>
+            </a:pPr>
+            <a:r>
+              <a:rPr lang="en-US" sz="2000" b="1" dirty="0" smtClean="0"/>
+              <a:t>SW =</a:t>
+            </a:r>
+            <a:r>
+              <a:rPr lang="en-US" sz="2000" dirty="0" smtClean="0"/>
+              <a:t> Smartwatch</a:t>
+            </a:r>
+            <a:endParaRPr lang="en-US" sz="2000" dirty="0" smtClean="0"/>
+          </a:p>
+        </p:txBody>
+      </p:sp>
+      <p:graphicFrame>
+        <p:nvGraphicFramePr>
+          <p:cNvPr id="6" name="Table 5"/>
+          <p:cNvGraphicFramePr>
+            <a:graphicFrameLocks noGrp="1"/>
+          </p:cNvGraphicFramePr>
+          <p:nvPr>
+            <p:extLst>
+              <p:ext uri="{D42A27DB-BD31-4B8C-83A1-F6EECF244321}">
+                <p14:modId xmlns:p14="http://schemas.microsoft.com/office/powerpoint/2010/main" val="83406797"/>
+              </p:ext>
+            </p:extLst>
+          </p:nvPr>
+        </p:nvGraphicFramePr>
+        <p:xfrm>
+          <a:off x="1117600" y="2460784"/>
+          <a:ext cx="10236201" cy="2194560"/>
+        </p:xfrm>
+        <a:graphic>
+          <a:graphicData uri="http://schemas.openxmlformats.org/drawingml/2006/table">
+            <a:tbl>
+              <a:tblPr firstRow="1" bandRow="1">
+                <a:tableStyleId>{5C22544A-7EE6-4342-B048-85BDC9FD1C3A}</a:tableStyleId>
+              </a:tblPr>
+              <a:tblGrid>
+                <a:gridCol w="2157940"/>
+                <a:gridCol w="1542240"/>
+                <a:gridCol w="2131371"/>
+                <a:gridCol w="2202325"/>
+                <a:gridCol w="2202325"/>
+              </a:tblGrid>
+              <a:tr h="370840">
+                <a:tc>
+                  <a:txBody>
+                    <a:bodyPr/>
+                    <a:lstStyle/>
+                    <a:p>
+                      <a:pPr algn="ctr"/>
+                      <a:r>
+                        <a:rPr lang="en-US" sz="2400" dirty="0" smtClean="0"/>
+                        <a:t>Sampling</a:t>
+                      </a:r>
+                      <a:r>
+                        <a:rPr lang="en-US" sz="2400" baseline="0" dirty="0" smtClean="0"/>
+                        <a:t> Frequency</a:t>
+                      </a:r>
+                      <a:endParaRPr lang="en-US" sz="2400" dirty="0"/>
+                    </a:p>
+                  </a:txBody>
+                  <a:tcPr/>
+                </a:tc>
+                <a:tc>
+                  <a:txBody>
+                    <a:bodyPr/>
+                    <a:lstStyle/>
+                    <a:p>
+                      <a:pPr algn="ctr"/>
+                      <a:r>
+                        <a:rPr lang="en-US" sz="2400" dirty="0" smtClean="0"/>
+                        <a:t>Window</a:t>
+                      </a:r>
+                      <a:r>
+                        <a:rPr lang="en-US" sz="2400" baseline="0" dirty="0" smtClean="0"/>
+                        <a:t> Size</a:t>
+                      </a:r>
+                      <a:endParaRPr lang="en-US" sz="2400" dirty="0"/>
+                    </a:p>
+                  </a:txBody>
+                  <a:tcPr/>
+                </a:tc>
+                <a:tc>
+                  <a:txBody>
+                    <a:bodyPr/>
+                    <a:lstStyle/>
+                    <a:p>
+                      <a:pPr algn="ctr"/>
+                      <a:r>
+                        <a:rPr lang="en-US" sz="2400" dirty="0" smtClean="0"/>
+                        <a:t>Accurac</a:t>
+                      </a:r>
+                      <a:r>
+                        <a:rPr lang="en-US" sz="2400" baseline="0" dirty="0" smtClean="0"/>
+                        <a:t>y Mean </a:t>
+                      </a:r>
+                    </a:p>
+                    <a:p>
+                      <a:pPr algn="ctr"/>
+                      <a:r>
+                        <a:rPr lang="en-US" sz="2400" baseline="0" dirty="0" smtClean="0"/>
+                        <a:t>(SP + SW)</a:t>
+                      </a:r>
+                      <a:endParaRPr lang="en-US" sz="2400" dirty="0"/>
+                    </a:p>
+                  </a:txBody>
+                  <a:tcPr/>
+                </a:tc>
+                <a:tc>
+                  <a:txBody>
+                    <a:bodyPr/>
+                    <a:lstStyle/>
+                    <a:p>
+                      <a:pPr algn="ctr"/>
+                      <a:r>
+                        <a:rPr lang="en-US" sz="2400" dirty="0" smtClean="0"/>
+                        <a:t>Accuracy Mean </a:t>
+                      </a:r>
+                    </a:p>
+                    <a:p>
+                      <a:pPr algn="ctr"/>
+                      <a:r>
+                        <a:rPr lang="en-US" sz="2400" dirty="0" smtClean="0"/>
+                        <a:t>(SP)</a:t>
+                      </a:r>
+                      <a:endParaRPr lang="en-US" sz="2400" dirty="0"/>
+                    </a:p>
+                  </a:txBody>
+                  <a:tcPr/>
+                </a:tc>
+                <a:tc>
+                  <a:txBody>
+                    <a:bodyPr/>
+                    <a:lstStyle/>
+                    <a:p>
+                      <a:pPr algn="ctr"/>
+                      <a:r>
+                        <a:rPr lang="en-US" sz="2400" dirty="0" smtClean="0"/>
+                        <a:t>Accuracy Mean</a:t>
+                      </a:r>
+                    </a:p>
+                    <a:p>
+                      <a:pPr algn="ctr"/>
+                      <a:r>
+                        <a:rPr lang="en-US" sz="2400" dirty="0" smtClean="0"/>
+                        <a:t>(SW)</a:t>
+                      </a:r>
+                      <a:endParaRPr lang="en-US" sz="2400" dirty="0"/>
+                    </a:p>
+                  </a:txBody>
+                  <a:tcPr/>
+                </a:tc>
+              </a:tr>
+              <a:tr h="370840">
+                <a:tc>
+                  <a:txBody>
+                    <a:bodyPr/>
+                    <a:lstStyle/>
+                    <a:p>
+                      <a:r>
+                        <a:rPr lang="en-US" sz="2400" dirty="0" smtClean="0"/>
+                        <a:t>10 Hz</a:t>
+                      </a:r>
+                      <a:endParaRPr lang="en-US" sz="2400" dirty="0"/>
+                    </a:p>
+                  </a:txBody>
+                  <a:tcPr/>
+                </a:tc>
+                <a:tc>
+                  <a:txBody>
+                    <a:bodyPr/>
+                    <a:lstStyle/>
+                    <a:p>
+                      <a:r>
+                        <a:rPr lang="en-US" sz="2400" dirty="0" smtClean="0"/>
+                        <a:t>1 second</a:t>
+                      </a:r>
+                      <a:endParaRPr lang="en-US" sz="2400" dirty="0"/>
+                    </a:p>
+                  </a:txBody>
+                  <a:tcPr/>
+                </a:tc>
+                <a:tc>
+                  <a:txBody>
+                    <a:bodyPr/>
+                    <a:lstStyle/>
+                    <a:p>
+                      <a:pPr algn="ctr"/>
+                      <a:r>
+                        <a:rPr lang="en-US" sz="2400" dirty="0" smtClean="0"/>
+                        <a:t>95.53%</a:t>
+                      </a:r>
+                      <a:endParaRPr lang="en-US" sz="2400" dirty="0"/>
+                    </a:p>
+                  </a:txBody>
+                  <a:tcPr/>
+                </a:tc>
+                <a:tc>
+                  <a:txBody>
+                    <a:bodyPr/>
+                    <a:lstStyle/>
+                    <a:p>
+                      <a:pPr algn="ctr"/>
+                      <a:r>
+                        <a:rPr lang="en-US" sz="2400" dirty="0" smtClean="0"/>
+                        <a:t>89.8%</a:t>
+                      </a:r>
+                      <a:endParaRPr lang="en-US" sz="2400" dirty="0"/>
+                    </a:p>
+                  </a:txBody>
+                  <a:tcPr/>
+                </a:tc>
+                <a:tc>
+                  <a:txBody>
+                    <a:bodyPr/>
+                    <a:lstStyle/>
+                    <a:p>
+                      <a:pPr algn="ctr"/>
+                      <a:r>
+                        <a:rPr lang="en-US" sz="2400" dirty="0" smtClean="0"/>
+                        <a:t>89.72%</a:t>
+                      </a:r>
+                      <a:endParaRPr lang="en-US" sz="2400" dirty="0"/>
+                    </a:p>
+                  </a:txBody>
+                  <a:tcPr/>
+                </a:tc>
+              </a:tr>
+              <a:tr h="370840">
+                <a:tc>
+                  <a:txBody>
+                    <a:bodyPr/>
+                    <a:lstStyle/>
+                    <a:p>
+                      <a:r>
+                        <a:rPr lang="en-US" sz="2400" dirty="0" smtClean="0"/>
+                        <a:t>10 Hz</a:t>
+                      </a:r>
+                      <a:endParaRPr lang="en-US" sz="2400" dirty="0"/>
+                    </a:p>
+                  </a:txBody>
+                  <a:tcPr/>
+                </a:tc>
+                <a:tc>
+                  <a:txBody>
+                    <a:bodyPr/>
+                    <a:lstStyle/>
+                    <a:p>
+                      <a:r>
+                        <a:rPr lang="en-US" sz="2400" dirty="0" smtClean="0"/>
+                        <a:t>2 seconds</a:t>
+                      </a:r>
+                      <a:endParaRPr lang="en-US" sz="2400" dirty="0"/>
+                    </a:p>
+                  </a:txBody>
+                  <a:tcPr/>
+                </a:tc>
+                <a:tc>
+                  <a:txBody>
+                    <a:bodyPr/>
+                    <a:lstStyle/>
+                    <a:p>
+                      <a:pPr algn="ctr"/>
+                      <a:r>
+                        <a:rPr lang="en-US" sz="2400" dirty="0" smtClean="0"/>
+                        <a:t>96.51%</a:t>
+                      </a:r>
+                      <a:endParaRPr lang="en-US" sz="2400" dirty="0"/>
+                    </a:p>
+                  </a:txBody>
+                  <a:tcPr/>
+                </a:tc>
+                <a:tc>
+                  <a:txBody>
+                    <a:bodyPr/>
+                    <a:lstStyle/>
+                    <a:p>
+                      <a:pPr algn="ctr"/>
+                      <a:r>
+                        <a:rPr lang="en-US" sz="2400" dirty="0" smtClean="0"/>
+                        <a:t>92%</a:t>
+                      </a:r>
+                      <a:endParaRPr lang="en-US" sz="2400" dirty="0"/>
+                    </a:p>
+                  </a:txBody>
+                  <a:tcPr/>
+                </a:tc>
+                <a:tc>
+                  <a:txBody>
+                    <a:bodyPr/>
+                    <a:lstStyle/>
+                    <a:p>
+                      <a:pPr algn="ctr"/>
+                      <a:r>
+                        <a:rPr lang="en-US" sz="2400" dirty="0" smtClean="0"/>
+                        <a:t>92.51%</a:t>
+                      </a:r>
+                      <a:endParaRPr lang="en-US" sz="2400" dirty="0"/>
+                    </a:p>
+                  </a:txBody>
+                  <a:tcPr/>
+                </a:tc>
+              </a:tr>
+              <a:tr h="370840">
+                <a:tc>
+                  <a:txBody>
+                    <a:bodyPr/>
+                    <a:lstStyle/>
+                    <a:p>
+                      <a:r>
+                        <a:rPr lang="en-US" sz="2400" dirty="0" smtClean="0"/>
+                        <a:t>10 Hz</a:t>
+                      </a:r>
+                      <a:endParaRPr lang="en-US" sz="2400" dirty="0"/>
+                    </a:p>
+                  </a:txBody>
+                  <a:tcPr/>
+                </a:tc>
+                <a:tc>
+                  <a:txBody>
+                    <a:bodyPr/>
+                    <a:lstStyle/>
+                    <a:p>
+                      <a:r>
+                        <a:rPr lang="en-US" sz="2400" dirty="0" smtClean="0"/>
+                        <a:t>3 seconds</a:t>
+                      </a:r>
+                      <a:endParaRPr lang="en-US" sz="2400" dirty="0"/>
+                    </a:p>
+                  </a:txBody>
+                  <a:tcPr/>
+                </a:tc>
+                <a:tc>
+                  <a:txBody>
+                    <a:bodyPr/>
+                    <a:lstStyle/>
+                    <a:p>
+                      <a:pPr algn="ctr"/>
+                      <a:r>
+                        <a:rPr lang="en-US" sz="2400" dirty="0" smtClean="0"/>
+                        <a:t>98.19%</a:t>
+                      </a:r>
+                      <a:endParaRPr lang="en-US" sz="2400" dirty="0"/>
+                    </a:p>
+                  </a:txBody>
+                  <a:tcPr/>
+                </a:tc>
+                <a:tc>
+                  <a:txBody>
+                    <a:bodyPr/>
+                    <a:lstStyle/>
+                    <a:p>
+                      <a:pPr algn="ctr"/>
+                      <a:r>
+                        <a:rPr lang="en-US" sz="2400" dirty="0" smtClean="0"/>
+                        <a:t>93.4%</a:t>
+                      </a:r>
+                      <a:endParaRPr lang="en-US" sz="2400" dirty="0"/>
+                    </a:p>
+                  </a:txBody>
+                  <a:tcPr/>
+                </a:tc>
+                <a:tc>
+                  <a:txBody>
+                    <a:bodyPr/>
+                    <a:lstStyle/>
+                    <a:p>
+                      <a:pPr algn="ctr"/>
+                      <a:r>
+                        <a:rPr lang="en-US" sz="2400" dirty="0" smtClean="0"/>
+                        <a:t>94.78%</a:t>
+                      </a:r>
+                      <a:endParaRPr lang="en-US" sz="2400" dirty="0"/>
+                    </a:p>
+                  </a:txBody>
+                  <a:tcPr/>
+                </a:tc>
+              </a:tr>
+            </a:tbl>
+          </a:graphicData>
+        </a:graphic>
+      </p:graphicFrame>
+    </p:spTree>
+    <p:extLst>
+      <p:ext uri="{BB962C8B-B14F-4D97-AF65-F5344CB8AC3E}">
+        <p14:creationId xmlns:p14="http://schemas.microsoft.com/office/powerpoint/2010/main" val="929418408"/>
+      </p:ext>
+    </p:extLst>
+  </p:cSld>
+  <p:clrMapOvr>
+    <a:masterClrMapping/>
+  </p:clrMapOvr>
+  <p:timing>
+    <p:tnLst>
+      <p:par>
+        <p:cTn id="1" dur="indefinite" restart="never" nodeType="tmRoot"/>
+      </p:par>
+    </p:tnLst>
+  </p:timing>
+</p:sld>
+</file>
+
+<file path=ppt/slides/slide12.xml><?xml version="1.0" encoding="utf-8"?>
+<p:sld xmlns:a="http://schemas.openxmlformats.org/drawingml/2006/main" xmlns:r="http://schemas.openxmlformats.org/officeDocument/2006/relationships" xmlns:p="http://schemas.openxmlformats.org/presentationml/2006/main">
+  <p:cSld>
+    <p:spTree>
+      <p:nvGrpSpPr>
+        <p:cNvPr id="1" name=""/>
+        <p:cNvGrpSpPr/>
+        <p:nvPr/>
+      </p:nvGrpSpPr>
+      <p:grpSpPr>
+        <a:xfrm>
+          <a:off x="0" y="0"/>
+          <a:ext cx="0" cy="0"/>
+          <a:chOff x="0" y="0"/>
+          <a:chExt cx="0" cy="0"/>
+        </a:xfrm>
+      </p:grpSpPr>
+      <p:sp>
+        <p:nvSpPr>
+          <p:cNvPr id="2" name="Title 1"/>
+          <p:cNvSpPr>
+            <a:spLocks noGrp="1"/>
+          </p:cNvSpPr>
+          <p:nvPr>
+            <p:ph type="title"/>
+          </p:nvPr>
+        </p:nvSpPr>
+        <p:spPr/>
+        <p:txBody>
+          <a:bodyPr/>
+          <a:lstStyle/>
+          <a:p>
+            <a:r>
+              <a:rPr lang="en-US" b="1" dirty="0" smtClean="0"/>
               <a:t>Random </a:t>
             </a:r>
             <a:r>
               <a:rPr lang="en-US" b="1" dirty="0" smtClean="0"/>
-              <a:t>Forest</a:t>
+              <a:t>Forest (SP + SW)</a:t>
             </a:r>
             <a:endParaRPr lang="en-US" b="1" dirty="0"/>
           </a:p>
@@ -4510,51 +4654,70 @@
           </a:xfrm>
         </p:spPr>
         <p:txBody>
-          <a:bodyPr/>
+          <a:bodyPr>
+            <a:normAutofit/>
+          </a:bodyPr>
           <a:lstStyle/>
           <a:p>
             <a:r>
-              <a:rPr lang="en-US" b="1" dirty="0" smtClean="0"/>
+              <a:rPr lang="en-US" sz="2400" b="1" dirty="0" smtClean="0"/>
               <a:t>Sampling frequency = </a:t>
             </a:r>
             <a:r>
-              <a:rPr lang="en-US" dirty="0" smtClean="0"/>
+              <a:rPr lang="en-US" sz="2400" dirty="0" smtClean="0"/>
               <a:t>10 Hz</a:t>
             </a:r>
           </a:p>
           <a:p>
             <a:r>
-              <a:rPr lang="en-US" b="1" dirty="0" smtClean="0"/>
+              <a:rPr lang="en-US" sz="2400" b="1" dirty="0" smtClean="0"/>
               <a:t>Window size = </a:t>
             </a:r>
             <a:r>
-              <a:rPr lang="en-US" dirty="0" smtClean="0"/>
+              <a:rPr lang="en-US" sz="2400" dirty="0" smtClean="0"/>
               <a:t>2s</a:t>
             </a:r>
           </a:p>
           <a:p>
-            <a:endParaRPr lang="en-US" dirty="0" smtClean="0"/>
-          </a:p>
-          <a:p>
-            <a:r>
-              <a:rPr lang="en-US" u="sng" dirty="0" smtClean="0"/>
+            <a:endParaRPr lang="en-US" sz="2400" dirty="0"/>
+          </a:p>
+          <a:p>
+            <a:r>
+              <a:rPr lang="en-US" sz="2400" b="1" dirty="0" smtClean="0"/>
+              <a:t>Number of Estimators tested:</a:t>
+            </a:r>
+          </a:p>
+          <a:p>
+            <a:pPr lvl="1"/>
+            <a:r>
+              <a:rPr lang="en-US" sz="2000" dirty="0" smtClean="0"/>
+              <a:t>1, 2, 3, 5, 10, 20, 30, 50, 100</a:t>
+            </a:r>
+            <a:endParaRPr lang="en-US" sz="2000" dirty="0" smtClean="0"/>
+          </a:p>
+          <a:p>
+            <a:endParaRPr lang="en-US" sz="2400" dirty="0" smtClean="0"/>
+          </a:p>
+          <a:p>
+            <a:r>
+              <a:rPr lang="en-US" sz="2400" u="sng" dirty="0" smtClean="0"/>
               <a:t>Above 50 estimators, it seems it is overfitting the training data</a:t>
             </a:r>
           </a:p>
           <a:p>
-            <a:endParaRPr lang="en-US" dirty="0" smtClean="0"/>
-          </a:p>
-          <a:p>
-            <a:endParaRPr lang="en-US" dirty="0"/>
-          </a:p>
-          <a:p>
-            <a:endParaRPr lang="en-US" dirty="0" smtClean="0"/>
-          </a:p>
-          <a:p>
-            <a:endParaRPr lang="en-US" dirty="0" smtClean="0"/>
-          </a:p>
-          <a:p>
-            <a:endParaRPr lang="en-US" dirty="0"/>
+            <a:endParaRPr lang="en-US" sz="2400" dirty="0" smtClean="0"/>
+          </a:p>
+          <a:p>
+            <a:endParaRPr lang="en-US" sz="2400" dirty="0"/>
+          </a:p>
+          <a:p>
+            <a:endParaRPr lang="en-US" sz="2400" dirty="0" smtClean="0"/>
+          </a:p>
+          <a:p>
+            <a:endParaRPr lang="en-US" sz="2400" dirty="0" smtClean="0"/>
+          </a:p>
+          <a:p>
+            <a:endParaRPr lang="en-US" sz="2400" dirty="0"/>
           </a:p>
         </p:txBody>
       </p:sp>
@@ -4598,492 +4761,13 @@
   <p:clrMapOvr>
     <a:masterClrMapping/>
   </p:clrMapOvr>
-</p:sld>
-</file>
-
-<file path=ppt/slides/slide12.xml><?xml version="1.0" encoding="utf-8"?>
-<p:sld xmlns:a="http://schemas.openxmlformats.org/drawingml/2006/main" xmlns:r="http://schemas.openxmlformats.org/officeDocument/2006/relationships" xmlns:p="http://schemas.openxmlformats.org/presentationml/2006/main">
-  <p:cSld>
-    <p:spTree>
-      <p:nvGrpSpPr>
-        <p:cNvPr id="1" name=""/>
-        <p:cNvGrpSpPr/>
-        <p:nvPr/>
-      </p:nvGrpSpPr>
-      <p:grpSpPr>
-        <a:xfrm>
-          <a:off x="0" y="0"/>
-          <a:ext cx="0" cy="0"/>
-          <a:chOff x="0" y="0"/>
-          <a:chExt cx="0" cy="0"/>
-        </a:xfrm>
-      </p:grpSpPr>
-      <p:sp>
-        <p:nvSpPr>
-          <p:cNvPr id="2" name="Title 1"/>
-          <p:cNvSpPr>
-            <a:spLocks noGrp="1"/>
-          </p:cNvSpPr>
-          <p:nvPr>
-            <p:ph type="title"/>
-          </p:nvPr>
-        </p:nvSpPr>
-        <p:spPr/>
-        <p:txBody>
-          <a:bodyPr/>
-          <a:lstStyle/>
-          <a:p>
-            <a:r>
-              <a:rPr lang="en-US" b="1" dirty="0" smtClean="0"/>
-              <a:t>SVM</a:t>
-            </a:r>
-            <a:endParaRPr lang="en-US" b="1" dirty="0"/>
-          </a:p>
-        </p:txBody>
-      </p:sp>
-      <p:sp>
-        <p:nvSpPr>
-          <p:cNvPr id="5" name="Content Placeholder 4"/>
-          <p:cNvSpPr>
-            <a:spLocks noGrp="1"/>
-          </p:cNvSpPr>
-          <p:nvPr>
-            <p:ph idx="1"/>
-          </p:nvPr>
-        </p:nvSpPr>
-        <p:spPr/>
-        <p:txBody>
-          <a:bodyPr/>
-          <a:lstStyle/>
-          <a:p>
-            <a:r>
-              <a:rPr lang="en-US" b="1" dirty="0" smtClean="0"/>
-              <a:t>C = </a:t>
-            </a:r>
-            <a:r>
-              <a:rPr lang="en-US" dirty="0" smtClean="0"/>
-              <a:t>10</a:t>
-            </a:r>
-            <a:r>
-              <a:rPr lang="en-US" b="1" dirty="0" smtClean="0"/>
-              <a:t>, kernel = </a:t>
-            </a:r>
-            <a:r>
-              <a:rPr lang="en-US" dirty="0" smtClean="0"/>
-              <a:t>RBF</a:t>
-            </a:r>
-          </a:p>
-          <a:p>
-            <a:endParaRPr lang="en-US" dirty="0"/>
-          </a:p>
-          <a:p>
-            <a:endParaRPr lang="en-US" dirty="0" smtClean="0"/>
-          </a:p>
-          <a:p>
-            <a:endParaRPr lang="en-US" dirty="0"/>
-          </a:p>
-          <a:p>
-            <a:endParaRPr lang="en-US" dirty="0" smtClean="0"/>
-          </a:p>
-          <a:p>
-            <a:endParaRPr lang="en-US" dirty="0"/>
-          </a:p>
-          <a:p>
-            <a:r>
-              <a:rPr lang="en-US" u="sng" dirty="0"/>
-              <a:t>The bigger the window size, the better it is</a:t>
-            </a:r>
-            <a:r>
-              <a:rPr lang="en-US" u="sng" dirty="0" smtClean="0"/>
-              <a:t>!</a:t>
-            </a:r>
-            <a:endParaRPr lang="en-US" dirty="0" smtClean="0"/>
-          </a:p>
-          <a:p>
-            <a:endParaRPr lang="en-US" dirty="0" smtClean="0"/>
-          </a:p>
-        </p:txBody>
-      </p:sp>
-      <p:graphicFrame>
-        <p:nvGraphicFramePr>
-          <p:cNvPr id="6" name="Table 5"/>
-          <p:cNvGraphicFramePr>
-            <a:graphicFrameLocks noGrp="1"/>
-          </p:cNvGraphicFramePr>
-          <p:nvPr>
-            <p:extLst>
-              <p:ext uri="{D42A27DB-BD31-4B8C-83A1-F6EECF244321}">
-                <p14:modId xmlns:p14="http://schemas.microsoft.com/office/powerpoint/2010/main" val="186358168"/>
-              </p:ext>
-            </p:extLst>
-          </p:nvPr>
-        </p:nvGraphicFramePr>
-        <p:xfrm>
-          <a:off x="1117600" y="2460784"/>
-          <a:ext cx="10426700" cy="2194560"/>
-        </p:xfrm>
-        <a:graphic>
-          <a:graphicData uri="http://schemas.openxmlformats.org/drawingml/2006/table">
-            <a:tbl>
-              <a:tblPr firstRow="1" bandRow="1">
-                <a:tableStyleId>{5C22544A-7EE6-4342-B048-85BDC9FD1C3A}</a:tableStyleId>
-              </a:tblPr>
-              <a:tblGrid>
-                <a:gridCol w="2126436"/>
-                <a:gridCol w="1759832"/>
-                <a:gridCol w="2240300"/>
-                <a:gridCol w="2150066"/>
-                <a:gridCol w="2150066"/>
-              </a:tblGrid>
-              <a:tr h="370840">
-                <a:tc>
-                  <a:txBody>
-                    <a:bodyPr/>
-                    <a:lstStyle/>
-                    <a:p>
-                      <a:pPr algn="ctr"/>
-                      <a:r>
-                        <a:rPr lang="en-US" sz="2400" dirty="0" smtClean="0"/>
-                        <a:t>Sampling</a:t>
-                      </a:r>
-                      <a:r>
-                        <a:rPr lang="en-US" sz="2400" baseline="0" dirty="0" smtClean="0"/>
-                        <a:t> Frequency</a:t>
-                      </a:r>
-                      <a:endParaRPr lang="en-US" sz="2400" dirty="0"/>
-                    </a:p>
-                  </a:txBody>
-                  <a:tcPr/>
-                </a:tc>
-                <a:tc>
-                  <a:txBody>
-                    <a:bodyPr/>
-                    <a:lstStyle/>
-                    <a:p>
-                      <a:pPr algn="ctr"/>
-                      <a:r>
-                        <a:rPr lang="en-US" sz="2400" dirty="0" smtClean="0"/>
-                        <a:t>Window</a:t>
-                      </a:r>
-                      <a:r>
-                        <a:rPr lang="en-US" sz="2400" baseline="0" dirty="0" smtClean="0"/>
-                        <a:t> Size</a:t>
-                      </a:r>
-                      <a:endParaRPr lang="en-US" sz="2400" dirty="0"/>
-                    </a:p>
-                  </a:txBody>
-                  <a:tcPr/>
-                </a:tc>
-                <a:tc>
-                  <a:txBody>
-                    <a:bodyPr/>
-                    <a:lstStyle/>
-                    <a:p>
-                      <a:pPr algn="ctr"/>
-                      <a:r>
-                        <a:rPr lang="en-US" sz="2400" dirty="0" smtClean="0"/>
-                        <a:t>Accurac</a:t>
-                      </a:r>
-                      <a:r>
-                        <a:rPr lang="en-US" sz="2400" baseline="0" dirty="0" smtClean="0"/>
-                        <a:t>y Mean</a:t>
-                      </a:r>
-                    </a:p>
-                    <a:p>
-                      <a:pPr algn="ctr"/>
-                      <a:r>
-                        <a:rPr lang="en-US" sz="2400" baseline="0" dirty="0" smtClean="0"/>
-                        <a:t>(SP + SW)</a:t>
-                      </a:r>
-                      <a:endParaRPr lang="en-US" sz="2400" dirty="0"/>
-                    </a:p>
-                  </a:txBody>
-                  <a:tcPr/>
-                </a:tc>
-                <a:tc>
-                  <a:txBody>
-                    <a:bodyPr/>
-                    <a:lstStyle/>
-                    <a:p>
-                      <a:pPr algn="ctr"/>
-                      <a:r>
-                        <a:rPr lang="en-US" sz="2400" dirty="0" smtClean="0"/>
-                        <a:t>Accuracy Mean</a:t>
-                      </a:r>
-                    </a:p>
-                    <a:p>
-                      <a:pPr algn="ctr"/>
-                      <a:r>
-                        <a:rPr lang="en-US" sz="2400" dirty="0" smtClean="0"/>
-                        <a:t>(SP)</a:t>
-                      </a:r>
-                      <a:endParaRPr lang="en-US" sz="2400" dirty="0"/>
-                    </a:p>
-                  </a:txBody>
-                  <a:tcPr/>
-                </a:tc>
-                <a:tc>
-                  <a:txBody>
-                    <a:bodyPr/>
-                    <a:lstStyle/>
-                    <a:p>
-                      <a:pPr algn="ctr"/>
-                      <a:r>
-                        <a:rPr lang="en-US" sz="2400" dirty="0" smtClean="0"/>
-                        <a:t>Accuracy Mean</a:t>
-                      </a:r>
-                    </a:p>
-                    <a:p>
-                      <a:pPr algn="ctr"/>
-                      <a:r>
-                        <a:rPr lang="en-US" sz="2400" dirty="0" smtClean="0"/>
-                        <a:t>(SW)</a:t>
-                      </a:r>
-                      <a:endParaRPr lang="en-US" sz="2400" dirty="0"/>
-                    </a:p>
-                  </a:txBody>
-                  <a:tcPr/>
-                </a:tc>
-              </a:tr>
-              <a:tr h="370840">
-                <a:tc>
-                  <a:txBody>
-                    <a:bodyPr/>
-                    <a:lstStyle/>
-                    <a:p>
-                      <a:r>
-                        <a:rPr lang="en-US" sz="2400" dirty="0" smtClean="0"/>
-                        <a:t>10 Hz</a:t>
-                      </a:r>
-                      <a:endParaRPr lang="en-US" sz="2400" dirty="0"/>
-                    </a:p>
-                  </a:txBody>
-                  <a:tcPr/>
-                </a:tc>
-                <a:tc>
-                  <a:txBody>
-                    <a:bodyPr/>
-                    <a:lstStyle/>
-                    <a:p>
-                      <a:r>
-                        <a:rPr lang="en-US" sz="2400" dirty="0" smtClean="0"/>
-                        <a:t>1 second</a:t>
-                      </a:r>
-                      <a:endParaRPr lang="en-US" sz="2400" dirty="0"/>
-                    </a:p>
-                  </a:txBody>
-                  <a:tcPr/>
-                </a:tc>
-                <a:tc>
-                  <a:txBody>
-                    <a:bodyPr/>
-                    <a:lstStyle/>
-                    <a:p>
-                      <a:pPr algn="ctr"/>
-                      <a:r>
-                        <a:rPr lang="en-US" sz="2400" dirty="0" smtClean="0"/>
-                        <a:t>94.39%</a:t>
-                      </a:r>
-                      <a:endParaRPr lang="en-US" sz="2400" dirty="0"/>
-                    </a:p>
-                  </a:txBody>
-                  <a:tcPr/>
-                </a:tc>
-                <a:tc>
-                  <a:txBody>
-                    <a:bodyPr/>
-                    <a:lstStyle/>
-                    <a:p>
-                      <a:pPr algn="ctr"/>
-                      <a:r>
-                        <a:rPr lang="en-US" sz="2400" dirty="0" smtClean="0"/>
-                        <a:t>79.25%</a:t>
-                      </a:r>
-                      <a:endParaRPr lang="en-US" sz="2400" dirty="0"/>
-                    </a:p>
-                  </a:txBody>
-                  <a:tcPr/>
-                </a:tc>
-                <a:tc>
-                  <a:txBody>
-                    <a:bodyPr/>
-                    <a:lstStyle/>
-                    <a:p>
-                      <a:pPr algn="ctr"/>
-                      <a:r>
-                        <a:rPr lang="en-US" sz="2400" dirty="0" smtClean="0"/>
-                        <a:t>82.10%</a:t>
-                      </a:r>
-                      <a:endParaRPr lang="en-US" sz="2400" dirty="0"/>
-                    </a:p>
-                  </a:txBody>
-                  <a:tcPr/>
-                </a:tc>
-              </a:tr>
-              <a:tr h="370840">
-                <a:tc>
-                  <a:txBody>
-                    <a:bodyPr/>
-                    <a:lstStyle/>
-                    <a:p>
-                      <a:r>
-                        <a:rPr lang="en-US" sz="2400" dirty="0" smtClean="0"/>
-                        <a:t>10 Hz</a:t>
-                      </a:r>
-                      <a:endParaRPr lang="en-US" sz="2400" dirty="0"/>
-                    </a:p>
-                  </a:txBody>
-                  <a:tcPr/>
-                </a:tc>
-                <a:tc>
-                  <a:txBody>
-                    <a:bodyPr/>
-                    <a:lstStyle/>
-                    <a:p>
-                      <a:r>
-                        <a:rPr lang="en-US" sz="2400" dirty="0" smtClean="0"/>
-                        <a:t>2 seconds</a:t>
-                      </a:r>
-                      <a:endParaRPr lang="en-US" sz="2400" dirty="0"/>
-                    </a:p>
-                  </a:txBody>
-                  <a:tcPr/>
-                </a:tc>
-                <a:tc>
-                  <a:txBody>
-                    <a:bodyPr/>
-                    <a:lstStyle/>
-                    <a:p>
-                      <a:pPr algn="ctr"/>
-                      <a:r>
-                        <a:rPr lang="en-US" sz="2400" dirty="0" smtClean="0"/>
-                        <a:t>96.33%</a:t>
-                      </a:r>
-                      <a:endParaRPr lang="en-US" sz="2400" dirty="0"/>
-                    </a:p>
-                  </a:txBody>
-                  <a:tcPr/>
-                </a:tc>
-                <a:tc>
-                  <a:txBody>
-                    <a:bodyPr/>
-                    <a:lstStyle/>
-                    <a:p>
-                      <a:pPr algn="ctr"/>
-                      <a:r>
-                        <a:rPr lang="en-US" sz="2400" dirty="0" smtClean="0"/>
-                        <a:t>82.92%</a:t>
-                      </a:r>
-                      <a:endParaRPr lang="en-US" sz="2400" dirty="0"/>
-                    </a:p>
-                  </a:txBody>
-                  <a:tcPr/>
-                </a:tc>
-                <a:tc>
-                  <a:txBody>
-                    <a:bodyPr/>
-                    <a:lstStyle/>
-                    <a:p>
-                      <a:pPr algn="ctr"/>
-                      <a:r>
-                        <a:rPr lang="en-US" sz="2400" dirty="0" smtClean="0"/>
-                        <a:t>86.67%</a:t>
-                      </a:r>
-                      <a:endParaRPr lang="en-US" sz="2400" dirty="0"/>
-                    </a:p>
-                  </a:txBody>
-                  <a:tcPr/>
-                </a:tc>
-              </a:tr>
-              <a:tr h="370840">
-                <a:tc>
-                  <a:txBody>
-                    <a:bodyPr/>
-                    <a:lstStyle/>
-                    <a:p>
-                      <a:r>
-                        <a:rPr lang="en-US" sz="2400" dirty="0" smtClean="0"/>
-                        <a:t>10 Hz</a:t>
-                      </a:r>
-                      <a:endParaRPr lang="en-US" sz="2400" dirty="0"/>
-                    </a:p>
-                  </a:txBody>
-                  <a:tcPr/>
-                </a:tc>
-                <a:tc>
-                  <a:txBody>
-                    <a:bodyPr/>
-                    <a:lstStyle/>
-                    <a:p>
-                      <a:r>
-                        <a:rPr lang="en-US" sz="2400" dirty="0" smtClean="0"/>
-                        <a:t>3 seconds</a:t>
-                      </a:r>
-                      <a:endParaRPr lang="en-US" sz="2400" dirty="0"/>
-                    </a:p>
-                  </a:txBody>
-                  <a:tcPr/>
-                </a:tc>
-                <a:tc>
-                  <a:txBody>
-                    <a:bodyPr/>
-                    <a:lstStyle/>
-                    <a:p>
-                      <a:pPr algn="ctr"/>
-                      <a:r>
-                        <a:rPr lang="en-US" sz="2400" dirty="0" smtClean="0"/>
-                        <a:t>96.87%</a:t>
-                      </a:r>
-                      <a:endParaRPr lang="en-US" sz="2400" dirty="0"/>
-                    </a:p>
-                  </a:txBody>
-                  <a:tcPr/>
-                </a:tc>
-                <a:tc>
-                  <a:txBody>
-                    <a:bodyPr/>
-                    <a:lstStyle/>
-                    <a:p>
-                      <a:pPr algn="ctr"/>
-                      <a:r>
-                        <a:rPr lang="en-US" sz="2400" dirty="0" smtClean="0"/>
-                        <a:t>85.88%</a:t>
-                      </a:r>
-                      <a:endParaRPr lang="en-US" sz="2400" dirty="0"/>
-                    </a:p>
-                  </a:txBody>
-                  <a:tcPr/>
-                </a:tc>
-                <a:tc>
-                  <a:txBody>
-                    <a:bodyPr/>
-                    <a:lstStyle/>
-                    <a:p>
-                      <a:pPr algn="ctr"/>
-                      <a:r>
-                        <a:rPr lang="en-US" sz="2400" dirty="0" smtClean="0"/>
-                        <a:t>87.17%</a:t>
-                      </a:r>
-                      <a:endParaRPr lang="en-US" sz="2400" dirty="0"/>
-                    </a:p>
-                  </a:txBody>
-                  <a:tcPr/>
-                </a:tc>
-              </a:tr>
-            </a:tbl>
-          </a:graphicData>
-        </a:graphic>
-      </p:graphicFrame>
-    </p:spTree>
-    <p:extLst>
-      <p:ext uri="{BB962C8B-B14F-4D97-AF65-F5344CB8AC3E}">
-        <p14:creationId xmlns:p14="http://schemas.microsoft.com/office/powerpoint/2010/main" val="966878741"/>
-      </p:ext>
-    </p:extLst>
-  </p:cSld>
-  <p:clrMapOvr>
-    <a:masterClrMapping/>
-  </p:clrMapOvr>
+  <p:timing>
+    <p:tnLst>
+      <p:par>
+        <p:cTn id="1" dur="indefinite" restart="never" nodeType="tmRoot"/>
+      </p:par>
+    </p:tnLst>
+  </p:timing>
 </p:sld>
 </file>
 
@@ -5121,15 +4805,731 @@
           <a:p>
             <a:r>
               <a:rPr lang="en-US" b="1" dirty="0" smtClean="0"/>
-              <a:t>SVM (</a:t>
-            </a:r>
-            <a:r>
-              <a:rPr lang="en-US" b="1" u="sng" dirty="0" smtClean="0"/>
-              <a:t>Smartphone + Smartwatch</a:t>
-            </a:r>
+              <a:t>Random Forest (50 estimators, SP + SW)</a:t>
+            </a:r>
+            <a:endParaRPr lang="en-US" b="1" dirty="0"/>
+          </a:p>
+        </p:txBody>
+      </p:sp>
+      <p:sp>
+        <p:nvSpPr>
+          <p:cNvPr id="3" name="Content Placeholder 2"/>
+          <p:cNvSpPr>
+            <a:spLocks noGrp="1"/>
+          </p:cNvSpPr>
+          <p:nvPr>
+            <p:ph idx="1"/>
+          </p:nvPr>
+        </p:nvSpPr>
+        <p:spPr>
+          <a:xfrm>
+            <a:off x="838200" y="1825625"/>
+            <a:ext cx="3332747" cy="4351338"/>
+          </a:xfrm>
+        </p:spPr>
+        <p:txBody>
+          <a:bodyPr/>
+          <a:lstStyle/>
+          <a:p>
+            <a:pPr marL="0" indent="0">
+              <a:buNone/>
+            </a:pPr>
+            <a:r>
+              <a:rPr lang="en-US" b="1" i="1" u="sng" dirty="0" smtClean="0"/>
+              <a:t>Please note that the confusion matrix is symmetrical</a:t>
+            </a:r>
+            <a:endParaRPr lang="en-US" b="1" i="1" u="sng" dirty="0"/>
+          </a:p>
+        </p:txBody>
+      </p:sp>
+      <p:pic>
+        <p:nvPicPr>
+          <p:cNvPr id="4" name="Picture 3"/>
+          <p:cNvPicPr>
+            <a:picLocks noChangeAspect="1"/>
+          </p:cNvPicPr>
+          <p:nvPr/>
+        </p:nvPicPr>
+        <p:blipFill>
+          <a:blip r:embed="rId2">
+            <a:extLst>
+              <a:ext uri="{28A0092B-C50C-407E-A947-70E740481C1C}">
+                <a14:useLocalDpi xmlns:a14="http://schemas.microsoft.com/office/drawing/2010/main" val="0"/>
+              </a:ext>
+            </a:extLst>
+          </a:blip>
+          <a:stretch>
+            <a:fillRect/>
+          </a:stretch>
+        </p:blipFill>
+        <p:spPr>
+          <a:xfrm>
+            <a:off x="4572000" y="0"/>
+            <a:ext cx="7620000" cy="6858000"/>
+          </a:xfrm>
+          <a:prstGeom prst="rect">
+            <a:avLst/>
+          </a:prstGeom>
+        </p:spPr>
+      </p:pic>
+    </p:spTree>
+    <p:extLst>
+      <p:ext uri="{BB962C8B-B14F-4D97-AF65-F5344CB8AC3E}">
+        <p14:creationId xmlns:p14="http://schemas.microsoft.com/office/powerpoint/2010/main" val="699088556"/>
+      </p:ext>
+    </p:extLst>
+  </p:cSld>
+  <p:clrMapOvr>
+    <a:masterClrMapping/>
+  </p:clrMapOvr>
+  <p:timing>
+    <p:tnLst>
+      <p:par>
+        <p:cTn id="1" dur="indefinite" restart="never" nodeType="tmRoot">
+          <p:childTnLst>
+            <p:seq concurrent="1" nextAc="seek">
+              <p:cTn id="2" dur="indefinite" nodeType="mainSeq">
+                <p:childTnLst>
+                  <p:par>
+                    <p:cTn id="3" fill="hold">
+                      <p:stCondLst>
+                        <p:cond delay="indefinite"/>
+                      </p:stCondLst>
+                      <p:childTnLst>
+                        <p:par>
+                          <p:cTn id="4" fill="hold">
+                            <p:stCondLst>
+                              <p:cond delay="0"/>
+                            </p:stCondLst>
+                            <p:childTnLst>
+                              <p:par>
+                                <p:cTn id="5" presetID="1" presetClass="entr" presetSubtype="0" fill="hold" nodeType="clickEffect">
+                                  <p:stCondLst>
+                                    <p:cond delay="0"/>
+                                  </p:stCondLst>
+                                  <p:childTnLst>
+                                    <p:set>
+                                      <p:cBhvr>
+                                        <p:cTn id="6" dur="1" fill="hold">
+                                          <p:stCondLst>
+                                            <p:cond delay="0"/>
+                                          </p:stCondLst>
+                                        </p:cTn>
+                                        <p:tgtEl>
+                                          <p:spTgt spid="4"/>
+                                        </p:tgtEl>
+                                        <p:attrNameLst>
+                                          <p:attrName>style.visibility</p:attrName>
+                                        </p:attrNameLst>
+                                      </p:cBhvr>
+                                      <p:to>
+                                        <p:strVal val="visible"/>
+                                      </p:to>
+                                    </p:set>
+                                  </p:childTnLst>
+                                </p:cTn>
+                              </p:par>
+                            </p:childTnLst>
+                          </p:cTn>
+                        </p:par>
+                      </p:childTnLst>
+                    </p:cTn>
+                  </p:par>
+                </p:childTnLst>
+              </p:cTn>
+              <p:prevCondLst>
+                <p:cond evt="onPrev" delay="0">
+                  <p:tgtEl>
+                    <p:sldTgt/>
+                  </p:tgtEl>
+                </p:cond>
+              </p:prevCondLst>
+              <p:nextCondLst>
+                <p:cond evt="onNext" delay="0">
+                  <p:tgtEl>
+                    <p:sldTgt/>
+                  </p:tgtEl>
+                </p:cond>
+              </p:nextCondLst>
+            </p:seq>
+          </p:childTnLst>
+        </p:cTn>
+      </p:par>
+    </p:tnLst>
+  </p:timing>
+</p:sld>
+</file>
+
+<file path=ppt/slides/slide14.xml><?xml version="1.0" encoding="utf-8"?>
+<p:sld xmlns:a="http://schemas.openxmlformats.org/drawingml/2006/main" xmlns:r="http://schemas.openxmlformats.org/officeDocument/2006/relationships" xmlns:p="http://schemas.openxmlformats.org/presentationml/2006/main">
+  <p:cSld>
+    <p:spTree>
+      <p:nvGrpSpPr>
+        <p:cNvPr id="1" name=""/>
+        <p:cNvGrpSpPr/>
+        <p:nvPr/>
+      </p:nvGrpSpPr>
+      <p:grpSpPr>
+        <a:xfrm>
+          <a:off x="0" y="0"/>
+          <a:ext cx="0" cy="0"/>
+          <a:chOff x="0" y="0"/>
+          <a:chExt cx="0" cy="0"/>
+        </a:xfrm>
+      </p:grpSpPr>
+      <p:sp>
+        <p:nvSpPr>
+          <p:cNvPr id="2" name="Title 1"/>
+          <p:cNvSpPr>
+            <a:spLocks noGrp="1"/>
+          </p:cNvSpPr>
+          <p:nvPr>
+            <p:ph type="title"/>
+          </p:nvPr>
+        </p:nvSpPr>
+        <p:spPr/>
+        <p:txBody>
+          <a:bodyPr/>
+          <a:lstStyle/>
+          <a:p>
             <a:r>
               <a:rPr lang="en-US" b="1" dirty="0" smtClean="0"/>
-              <a:t>)</a:t>
+              <a:t>SVM</a:t>
+            </a:r>
+            <a:endParaRPr lang="en-US" b="1" dirty="0"/>
+          </a:p>
+        </p:txBody>
+      </p:sp>
+      <p:sp>
+        <p:nvSpPr>
+          <p:cNvPr id="5" name="Content Placeholder 4"/>
+          <p:cNvSpPr>
+            <a:spLocks noGrp="1"/>
+          </p:cNvSpPr>
+          <p:nvPr>
+            <p:ph idx="1"/>
+          </p:nvPr>
+        </p:nvSpPr>
+        <p:spPr>
+          <a:xfrm>
+            <a:off x="838200" y="1825624"/>
+            <a:ext cx="10515600" cy="5032375"/>
+          </a:xfrm>
+        </p:spPr>
+        <p:txBody>
+          <a:bodyPr>
+            <a:normAutofit/>
+          </a:bodyPr>
+          <a:lstStyle/>
+          <a:p>
+            <a:r>
+              <a:rPr lang="en-US" b="1" dirty="0" smtClean="0"/>
+              <a:t>C = </a:t>
+            </a:r>
+            <a:r>
+              <a:rPr lang="en-US" dirty="0" smtClean="0"/>
+              <a:t>10</a:t>
+            </a:r>
+            <a:r>
+              <a:rPr lang="en-US" b="1" dirty="0" smtClean="0"/>
+              <a:t>, kernel = </a:t>
+            </a:r>
+            <a:r>
+              <a:rPr lang="en-US" dirty="0" smtClean="0"/>
+              <a:t>RBF</a:t>
+            </a:r>
+          </a:p>
+          <a:p>
+            <a:endParaRPr lang="en-US" dirty="0"/>
+          </a:p>
+          <a:p>
+            <a:endParaRPr lang="en-US" dirty="0" smtClean="0"/>
+          </a:p>
+          <a:p>
+            <a:endParaRPr lang="en-US" dirty="0"/>
+          </a:p>
+          <a:p>
+            <a:endParaRPr lang="en-US" dirty="0" smtClean="0"/>
+          </a:p>
+          <a:p>
+            <a:endParaRPr lang="en-US" dirty="0"/>
+          </a:p>
+          <a:p>
+            <a:r>
+              <a:rPr lang="en-US" u="sng" dirty="0"/>
+              <a:t>The bigger the window size, the better it is</a:t>
+            </a:r>
+            <a:r>
+              <a:rPr lang="en-US" u="sng" dirty="0" smtClean="0"/>
+              <a:t>!</a:t>
+            </a:r>
+            <a:endParaRPr lang="en-US" dirty="0" smtClean="0"/>
+          </a:p>
+          <a:p>
+            <a:endParaRPr lang="en-US" dirty="0" smtClean="0"/>
+          </a:p>
+          <a:p>
+            <a:pPr marL="0" indent="0">
+              <a:buNone/>
+            </a:pPr>
+            <a:r>
+              <a:rPr lang="en-US" sz="2000" b="1" dirty="0"/>
+              <a:t>SP =</a:t>
+            </a:r>
+            <a:r>
+              <a:rPr lang="en-US" sz="2000" dirty="0"/>
+              <a:t> Smartphone</a:t>
+            </a:r>
+          </a:p>
+          <a:p>
+            <a:pPr marL="0" indent="0">
+              <a:buNone/>
+            </a:pPr>
+            <a:r>
+              <a:rPr lang="en-US" sz="2000" b="1" dirty="0"/>
+              <a:t>SW =</a:t>
+            </a:r>
+            <a:r>
+              <a:rPr lang="en-US" sz="2000" dirty="0"/>
+              <a:t> </a:t>
+            </a:r>
+            <a:r>
+              <a:rPr lang="en-US" sz="2000" dirty="0" smtClean="0"/>
+              <a:t>Smartwatch</a:t>
+            </a:r>
+            <a:endParaRPr lang="en-US" sz="2000" dirty="0"/>
+          </a:p>
+        </p:txBody>
+      </p:sp>
+      <p:graphicFrame>
+        <p:nvGraphicFramePr>
+          <p:cNvPr id="6" name="Table 5"/>
+          <p:cNvGraphicFramePr>
+            <a:graphicFrameLocks noGrp="1"/>
+          </p:cNvGraphicFramePr>
+          <p:nvPr>
+            <p:extLst>
+              <p:ext uri="{D42A27DB-BD31-4B8C-83A1-F6EECF244321}">
+                <p14:modId xmlns:p14="http://schemas.microsoft.com/office/powerpoint/2010/main" val="186358168"/>
+              </p:ext>
+            </p:extLst>
+          </p:nvPr>
+        </p:nvGraphicFramePr>
+        <p:xfrm>
+          <a:off x="1117600" y="2460784"/>
+          <a:ext cx="10426700" cy="2194560"/>
+        </p:xfrm>
+        <a:graphic>
+          <a:graphicData uri="http://schemas.openxmlformats.org/drawingml/2006/table">
+            <a:tbl>
+              <a:tblPr firstRow="1" bandRow="1">
+                <a:tableStyleId>{5C22544A-7EE6-4342-B048-85BDC9FD1C3A}</a:tableStyleId>
+              </a:tblPr>
+              <a:tblGrid>
+                <a:gridCol w="2126436"/>
+                <a:gridCol w="1759832"/>
+                <a:gridCol w="2240300"/>
+                <a:gridCol w="2150066"/>
+                <a:gridCol w="2150066"/>
+              </a:tblGrid>
+              <a:tr h="370840">
+                <a:tc>
+                  <a:txBody>
+                    <a:bodyPr/>
+                    <a:lstStyle/>
+                    <a:p>
+                      <a:pPr algn="ctr"/>
+                      <a:r>
+                        <a:rPr lang="en-US" sz="2400" dirty="0" smtClean="0"/>
+                        <a:t>Sampling</a:t>
+                      </a:r>
+                      <a:r>
+                        <a:rPr lang="en-US" sz="2400" baseline="0" dirty="0" smtClean="0"/>
+                        <a:t> Frequency</a:t>
+                      </a:r>
+                      <a:endParaRPr lang="en-US" sz="2400" dirty="0"/>
+                    </a:p>
+                  </a:txBody>
+                  <a:tcPr/>
+                </a:tc>
+                <a:tc>
+                  <a:txBody>
+                    <a:bodyPr/>
+                    <a:lstStyle/>
+                    <a:p>
+                      <a:pPr algn="ctr"/>
+                      <a:r>
+                        <a:rPr lang="en-US" sz="2400" dirty="0" smtClean="0"/>
+                        <a:t>Window</a:t>
+                      </a:r>
+                      <a:r>
+                        <a:rPr lang="en-US" sz="2400" baseline="0" dirty="0" smtClean="0"/>
+                        <a:t> Size</a:t>
+                      </a:r>
+                      <a:endParaRPr lang="en-US" sz="2400" dirty="0"/>
+                    </a:p>
+                  </a:txBody>
+                  <a:tcPr/>
+                </a:tc>
+                <a:tc>
+                  <a:txBody>
+                    <a:bodyPr/>
+                    <a:lstStyle/>
+                    <a:p>
+                      <a:pPr algn="ctr"/>
+                      <a:r>
+                        <a:rPr lang="en-US" sz="2400" dirty="0" smtClean="0"/>
+                        <a:t>Accurac</a:t>
+                      </a:r>
+                      <a:r>
+                        <a:rPr lang="en-US" sz="2400" baseline="0" dirty="0" smtClean="0"/>
+                        <a:t>y Mean</a:t>
+                      </a:r>
+                    </a:p>
+                    <a:p>
+                      <a:pPr algn="ctr"/>
+                      <a:r>
+                        <a:rPr lang="en-US" sz="2400" baseline="0" dirty="0" smtClean="0"/>
+                        <a:t>(SP + SW)</a:t>
+                      </a:r>
+                      <a:endParaRPr lang="en-US" sz="2400" dirty="0"/>
+                    </a:p>
+                  </a:txBody>
+                  <a:tcPr/>
+                </a:tc>
+                <a:tc>
+                  <a:txBody>
+                    <a:bodyPr/>
+                    <a:lstStyle/>
+                    <a:p>
+                      <a:pPr algn="ctr"/>
+                      <a:r>
+                        <a:rPr lang="en-US" sz="2400" dirty="0" smtClean="0"/>
+                        <a:t>Accuracy Mean</a:t>
+                      </a:r>
+                    </a:p>
+                    <a:p>
+                      <a:pPr algn="ctr"/>
+                      <a:r>
+                        <a:rPr lang="en-US" sz="2400" dirty="0" smtClean="0"/>
+                        <a:t>(SP)</a:t>
+                      </a:r>
+                      <a:endParaRPr lang="en-US" sz="2400" dirty="0"/>
+                    </a:p>
+                  </a:txBody>
+                  <a:tcPr/>
+                </a:tc>
+                <a:tc>
+                  <a:txBody>
+                    <a:bodyPr/>
+                    <a:lstStyle/>
+                    <a:p>
+                      <a:pPr algn="ctr"/>
+                      <a:r>
+                        <a:rPr lang="en-US" sz="2400" dirty="0" smtClean="0"/>
+                        <a:t>Accuracy Mean</a:t>
+                      </a:r>
+                    </a:p>
+                    <a:p>
+                      <a:pPr algn="ctr"/>
+                      <a:r>
+                        <a:rPr lang="en-US" sz="2400" dirty="0" smtClean="0"/>
+                        <a:t>(SW)</a:t>
+                      </a:r>
+                      <a:endParaRPr lang="en-US" sz="2400" dirty="0"/>
+                    </a:p>
+                  </a:txBody>
+                  <a:tcPr/>
+                </a:tc>
+              </a:tr>
+              <a:tr h="370840">
+                <a:tc>
+                  <a:txBody>
+                    <a:bodyPr/>
+                    <a:lstStyle/>
+                    <a:p>
+                      <a:r>
+                        <a:rPr lang="en-US" sz="2400" dirty="0" smtClean="0"/>
+                        <a:t>10 Hz</a:t>
+                      </a:r>
+                      <a:endParaRPr lang="en-US" sz="2400" dirty="0"/>
+                    </a:p>
+                  </a:txBody>
+                  <a:tcPr/>
+                </a:tc>
+                <a:tc>
+                  <a:txBody>
+                    <a:bodyPr/>
+                    <a:lstStyle/>
+                    <a:p>
+                      <a:r>
+                        <a:rPr lang="en-US" sz="2400" dirty="0" smtClean="0"/>
+                        <a:t>1 second</a:t>
+                      </a:r>
+                      <a:endParaRPr lang="en-US" sz="2400" dirty="0"/>
+                    </a:p>
+                  </a:txBody>
+                  <a:tcPr/>
+                </a:tc>
+                <a:tc>
+                  <a:txBody>
+                    <a:bodyPr/>
+                    <a:lstStyle/>
+                    <a:p>
+                      <a:pPr algn="ctr"/>
+                      <a:r>
+                        <a:rPr lang="en-US" sz="2400" dirty="0" smtClean="0"/>
+                        <a:t>94.39%</a:t>
+                      </a:r>
+                      <a:endParaRPr lang="en-US" sz="2400" dirty="0"/>
+                    </a:p>
+                  </a:txBody>
+                  <a:tcPr/>
+                </a:tc>
+                <a:tc>
+                  <a:txBody>
+                    <a:bodyPr/>
+                    <a:lstStyle/>
+                    <a:p>
+                      <a:pPr algn="ctr"/>
+                      <a:r>
+                        <a:rPr lang="en-US" sz="2400" dirty="0" smtClean="0"/>
+                        <a:t>79.25%</a:t>
+                      </a:r>
+                      <a:endParaRPr lang="en-US" sz="2400" dirty="0"/>
+                    </a:p>
+                  </a:txBody>
+                  <a:tcPr/>
+                </a:tc>
+                <a:tc>
+                  <a:txBody>
+                    <a:bodyPr/>
+                    <a:lstStyle/>
+                    <a:p>
+                      <a:pPr algn="ctr"/>
+                      <a:r>
+                        <a:rPr lang="en-US" sz="2400" dirty="0" smtClean="0"/>
+                        <a:t>82.10%</a:t>
+                      </a:r>
+                      <a:endParaRPr lang="en-US" sz="2400" dirty="0"/>
+                    </a:p>
+                  </a:txBody>
+                  <a:tcPr/>
+                </a:tc>
+              </a:tr>
+              <a:tr h="370840">
+                <a:tc>
+                  <a:txBody>
+                    <a:bodyPr/>
+                    <a:lstStyle/>
+                    <a:p>
+                      <a:r>
+                        <a:rPr lang="en-US" sz="2400" dirty="0" smtClean="0"/>
+                        <a:t>10 Hz</a:t>
+                      </a:r>
+                      <a:endParaRPr lang="en-US" sz="2400" dirty="0"/>
+                    </a:p>
+                  </a:txBody>
+                  <a:tcPr/>
+                </a:tc>
+                <a:tc>
+                  <a:txBody>
+                    <a:bodyPr/>
+                    <a:lstStyle/>
+                    <a:p>
+                      <a:r>
+                        <a:rPr lang="en-US" sz="2400" dirty="0" smtClean="0"/>
+                        <a:t>2 seconds</a:t>
+                      </a:r>
+                      <a:endParaRPr lang="en-US" sz="2400" dirty="0"/>
+                    </a:p>
+                  </a:txBody>
+                  <a:tcPr/>
+                </a:tc>
+                <a:tc>
+                  <a:txBody>
+                    <a:bodyPr/>
+                    <a:lstStyle/>
+                    <a:p>
+                      <a:pPr algn="ctr"/>
+                      <a:r>
+                        <a:rPr lang="en-US" sz="2400" dirty="0" smtClean="0"/>
+                        <a:t>96.33%</a:t>
+                      </a:r>
+                      <a:endParaRPr lang="en-US" sz="2400" dirty="0"/>
+                    </a:p>
+                  </a:txBody>
+                  <a:tcPr/>
+                </a:tc>
+                <a:tc>
+                  <a:txBody>
+                    <a:bodyPr/>
+                    <a:lstStyle/>
+                    <a:p>
+                      <a:pPr algn="ctr"/>
+                      <a:r>
+                        <a:rPr lang="en-US" sz="2400" dirty="0" smtClean="0"/>
+                        <a:t>82.92%</a:t>
+                      </a:r>
+                      <a:endParaRPr lang="en-US" sz="2400" dirty="0"/>
+                    </a:p>
+                  </a:txBody>
+                  <a:tcPr/>
+                </a:tc>
+                <a:tc>
+                  <a:txBody>
+                    <a:bodyPr/>
+                    <a:lstStyle/>
+                    <a:p>
+                      <a:pPr algn="ctr"/>
+                      <a:r>
+                        <a:rPr lang="en-US" sz="2400" dirty="0" smtClean="0"/>
+                        <a:t>86.67%</a:t>
+                      </a:r>
+                      <a:endParaRPr lang="en-US" sz="2400" dirty="0"/>
+                    </a:p>
+                  </a:txBody>
+                  <a:tcPr/>
+                </a:tc>
+              </a:tr>
+              <a:tr h="370840">
+                <a:tc>
+                  <a:txBody>
+                    <a:bodyPr/>
+                    <a:lstStyle/>
+                    <a:p>
+                      <a:r>
+                        <a:rPr lang="en-US" sz="2400" dirty="0" smtClean="0"/>
+                        <a:t>10 Hz</a:t>
+                      </a:r>
+                      <a:endParaRPr lang="en-US" sz="2400" dirty="0"/>
+                    </a:p>
+                  </a:txBody>
+                  <a:tcPr/>
+                </a:tc>
+                <a:tc>
+                  <a:txBody>
+                    <a:bodyPr/>
+                    <a:lstStyle/>
+                    <a:p>
+                      <a:r>
+                        <a:rPr lang="en-US" sz="2400" dirty="0" smtClean="0"/>
+                        <a:t>3 seconds</a:t>
+                      </a:r>
+                      <a:endParaRPr lang="en-US" sz="2400" dirty="0"/>
+                    </a:p>
+                  </a:txBody>
+                  <a:tcPr/>
+                </a:tc>
+                <a:tc>
+                  <a:txBody>
+                    <a:bodyPr/>
+                    <a:lstStyle/>
+                    <a:p>
+                      <a:pPr algn="ctr"/>
+                      <a:r>
+                        <a:rPr lang="en-US" sz="2400" dirty="0" smtClean="0"/>
+                        <a:t>96.87%</a:t>
+                      </a:r>
+                      <a:endParaRPr lang="en-US" sz="2400" dirty="0"/>
+                    </a:p>
+                  </a:txBody>
+                  <a:tcPr/>
+                </a:tc>
+                <a:tc>
+                  <a:txBody>
+                    <a:bodyPr/>
+                    <a:lstStyle/>
+                    <a:p>
+                      <a:pPr algn="ctr"/>
+                      <a:r>
+                        <a:rPr lang="en-US" sz="2400" dirty="0" smtClean="0"/>
+                        <a:t>85.88%</a:t>
+                      </a:r>
+                      <a:endParaRPr lang="en-US" sz="2400" dirty="0"/>
+                    </a:p>
+                  </a:txBody>
+                  <a:tcPr/>
+                </a:tc>
+                <a:tc>
+                  <a:txBody>
+                    <a:bodyPr/>
+                    <a:lstStyle/>
+                    <a:p>
+                      <a:pPr algn="ctr"/>
+                      <a:r>
+                        <a:rPr lang="en-US" sz="2400" dirty="0" smtClean="0"/>
+                        <a:t>87.17%</a:t>
+                      </a:r>
+                      <a:endParaRPr lang="en-US" sz="2400" dirty="0"/>
+                    </a:p>
+                  </a:txBody>
+                  <a:tcPr/>
+                </a:tc>
+              </a:tr>
+            </a:tbl>
+          </a:graphicData>
+        </a:graphic>
+      </p:graphicFrame>
+    </p:spTree>
+    <p:extLst>
+      <p:ext uri="{BB962C8B-B14F-4D97-AF65-F5344CB8AC3E}">
+        <p14:creationId xmlns:p14="http://schemas.microsoft.com/office/powerpoint/2010/main" val="966878741"/>
+      </p:ext>
+    </p:extLst>
+  </p:cSld>
+  <p:clrMapOvr>
+    <a:masterClrMapping/>
+  </p:clrMapOvr>
+  <p:timing>
+    <p:tnLst>
+      <p:par>
+        <p:cTn id="1" dur="indefinite" restart="never" nodeType="tmRoot"/>
+      </p:par>
+    </p:tnLst>
+  </p:timing>
+</p:sld>
+</file>
+
+<file path=ppt/slides/slide15.xml><?xml version="1.0" encoding="utf-8"?>
+<p:sld xmlns:a="http://schemas.openxmlformats.org/drawingml/2006/main" xmlns:r="http://schemas.openxmlformats.org/officeDocument/2006/relationships" xmlns:p="http://schemas.openxmlformats.org/presentationml/2006/main">
+  <p:cSld>
+    <p:spTree>
+      <p:nvGrpSpPr>
+        <p:cNvPr id="1" name=""/>
+        <p:cNvGrpSpPr/>
+        <p:nvPr/>
+      </p:nvGrpSpPr>
+      <p:grpSpPr>
+        <a:xfrm>
+          <a:off x="0" y="0"/>
+          <a:ext cx="0" cy="0"/>
+          <a:chOff x="0" y="0"/>
+          <a:chExt cx="0" cy="0"/>
+        </a:xfrm>
+      </p:grpSpPr>
+      <p:sp>
+        <p:nvSpPr>
+          <p:cNvPr id="2" name="Title 1"/>
+          <p:cNvSpPr>
+            <a:spLocks noGrp="1"/>
+          </p:cNvSpPr>
+          <p:nvPr>
+            <p:ph type="title"/>
+          </p:nvPr>
+        </p:nvSpPr>
+        <p:spPr/>
+        <p:txBody>
+          <a:bodyPr/>
+          <a:lstStyle/>
+          <a:p>
+            <a:r>
+              <a:rPr lang="en-US" b="1" dirty="0" smtClean="0"/>
+              <a:t>SVM </a:t>
+            </a:r>
+            <a:r>
+              <a:rPr lang="en-US" b="1" dirty="0" smtClean="0"/>
+              <a:t>(SP + SW)</a:t>
             </a:r>
             <a:endParaRPr lang="en-US" b="1" dirty="0"/>
           </a:p>
@@ -5152,62 +5552,85 @@
           </a:xfrm>
         </p:spPr>
         <p:txBody>
-          <a:bodyPr/>
+          <a:bodyPr>
+            <a:normAutofit/>
+          </a:bodyPr>
           <a:lstStyle/>
           <a:p>
             <a:r>
-              <a:rPr lang="en-US" b="1" dirty="0" smtClean="0"/>
+              <a:rPr lang="en-US" sz="2400" b="1" dirty="0" smtClean="0"/>
               <a:t>Sampling frequency = </a:t>
             </a:r>
             <a:r>
-              <a:rPr lang="en-US" dirty="0" smtClean="0"/>
+              <a:rPr lang="en-US" sz="2400" dirty="0" smtClean="0"/>
               <a:t>10 Hz</a:t>
             </a:r>
           </a:p>
           <a:p>
             <a:r>
-              <a:rPr lang="en-US" b="1" dirty="0" smtClean="0"/>
+              <a:rPr lang="en-US" sz="2400" b="1" dirty="0" smtClean="0"/>
               <a:t>Window size = </a:t>
             </a:r>
             <a:r>
-              <a:rPr lang="en-US" dirty="0" smtClean="0"/>
+              <a:rPr lang="en-US" sz="2400" dirty="0" smtClean="0"/>
               <a:t>2s</a:t>
             </a:r>
           </a:p>
           <a:p>
             <a:r>
-              <a:rPr lang="en-US" b="1" dirty="0" smtClean="0"/>
+              <a:rPr lang="en-US" sz="2400" b="1" dirty="0" smtClean="0"/>
               <a:t>Kernel = </a:t>
             </a:r>
             <a:r>
-              <a:rPr lang="en-US" dirty="0" smtClean="0"/>
+              <a:rPr lang="en-US" sz="2400" dirty="0" smtClean="0"/>
               <a:t>RBF</a:t>
             </a:r>
           </a:p>
           <a:p>
-            <a:endParaRPr lang="en-US" dirty="0" smtClean="0"/>
-          </a:p>
-          <a:p>
-            <a:r>
-              <a:rPr lang="en-US" u="sng" dirty="0" smtClean="0"/>
-              <a:t>The bigger the cost is, the better it is!</a:t>
-            </a:r>
-            <a:endParaRPr lang="en-US" u="sng" dirty="0"/>
-          </a:p>
-          <a:p>
-            <a:endParaRPr lang="en-US" dirty="0" smtClean="0"/>
-          </a:p>
-          <a:p>
-            <a:endParaRPr lang="en-US" dirty="0"/>
-          </a:p>
-          <a:p>
-            <a:endParaRPr lang="en-US" dirty="0" smtClean="0"/>
-          </a:p>
-          <a:p>
-            <a:endParaRPr lang="en-US" dirty="0" smtClean="0"/>
-          </a:p>
-          <a:p>
-            <a:endParaRPr lang="en-US" dirty="0"/>
+            <a:endParaRPr lang="en-US" sz="2400" dirty="0"/>
+          </a:p>
+          <a:p>
+            <a:r>
+              <a:rPr lang="en-US" sz="2400" b="1" dirty="0" smtClean="0"/>
+              <a:t>Cost Value </a:t>
+            </a:r>
+            <a:r>
+              <a:rPr lang="en-US" sz="2400" b="1" dirty="0"/>
+              <a:t>tested:</a:t>
+            </a:r>
+          </a:p>
+          <a:p>
+            <a:pPr lvl="1"/>
+            <a:r>
+              <a:rPr lang="en-US" sz="2000" dirty="0" smtClean="0"/>
+              <a:t>1, 3, 5, 10, 30, 50, 100</a:t>
+            </a:r>
+            <a:endParaRPr lang="en-US" sz="2000" dirty="0" smtClean="0"/>
+          </a:p>
+          <a:p>
+            <a:endParaRPr lang="en-US" sz="2400" dirty="0" smtClean="0"/>
+          </a:p>
+          <a:p>
+            <a:r>
+              <a:rPr lang="en-US" sz="2400" u="sng" dirty="0" smtClean="0"/>
+              <a:t>The bigger the </a:t>
+            </a:r>
+            <a:r>
+              <a:rPr lang="en-US" sz="2400" u="sng" dirty="0" smtClean="0"/>
+              <a:t>cost (C) </a:t>
+            </a:r>
+            <a:r>
+              <a:rPr lang="en-US" sz="2400" u="sng" dirty="0" smtClean="0"/>
+              <a:t>is, the better it is</a:t>
+            </a:r>
+            <a:r>
+              <a:rPr lang="en-US" sz="2400" u="sng" dirty="0" smtClean="0"/>
+              <a:t>!</a:t>
+            </a:r>
+            <a:endParaRPr lang="en-US" sz="2400" dirty="0" smtClean="0"/>
+          </a:p>
+          <a:p>
+            <a:endParaRPr lang="en-US" sz="2400" dirty="0"/>
           </a:p>
         </p:txBody>
       </p:sp>
@@ -5251,10 +5674,17 @@
   <p:clrMapOvr>
     <a:masterClrMapping/>
   </p:clrMapOvr>
+  <p:timing>
+    <p:tnLst>
+      <p:par>
+        <p:cTn id="1" dur="indefinite" restart="never" nodeType="tmRoot"/>
+      </p:par>
+    </p:tnLst>
+  </p:timing>
 </p:sld>
 </file>
 
-<file path=ppt/slides/slide14.xml><?xml version="1.0" encoding="utf-8"?>
+<file path=ppt/slides/slide16.xml><?xml version="1.0" encoding="utf-8"?>
 <p:sld xmlns:a="http://schemas.openxmlformats.org/drawingml/2006/main" xmlns:r="http://schemas.openxmlformats.org/officeDocument/2006/relationships" xmlns:p="http://schemas.openxmlformats.org/presentationml/2006/main">
   <p:cSld>
     <p:spTree>
@@ -5348,10 +5778,17 @@
   <p:clrMapOvr>
     <a:masterClrMapping/>
   </p:clrMapOvr>
+  <p:timing>
+    <p:tnLst>
+      <p:par>
+        <p:cTn id="1" dur="indefinite" restart="never" nodeType="tmRoot"/>
+      </p:par>
+    </p:tnLst>
+  </p:timing>
 </p:sld>
 </file>
 
-<file path=ppt/slides/slide15.xml><?xml version="1.0" encoding="utf-8"?>
+<file path=ppt/slides/slide17.xml><?xml version="1.0" encoding="utf-8"?>
 <p:sld xmlns:a="http://schemas.openxmlformats.org/drawingml/2006/main" xmlns:r="http://schemas.openxmlformats.org/officeDocument/2006/relationships" xmlns:p="http://schemas.openxmlformats.org/presentationml/2006/main">
   <p:cSld>
     <p:spTree>
@@ -5442,9 +5879,21 @@
           <a:p>
             <a:r>
               <a:rPr lang="en-US" b="1" dirty="0" smtClean="0"/>
-              <a:t>Gather friends’ data (?)</a:t>
-            </a:r>
-            <a:endParaRPr lang="en-US" b="1" dirty="0" smtClean="0"/>
+              <a:t>Gather friends’ data </a:t>
+            </a:r>
+            <a:r>
+              <a:rPr lang="en-US" dirty="0" smtClean="0"/>
+              <a:t>(</a:t>
+            </a:r>
+            <a:r>
+              <a:rPr lang="en-US" i="1" u="sng" dirty="0" smtClean="0"/>
+              <a:t>focus more on this</a:t>
+            </a:r>
+            <a:r>
+              <a:rPr lang="en-US" dirty="0" smtClean="0"/>
+              <a:t>)</a:t>
+            </a:r>
+            <a:endParaRPr lang="en-US" dirty="0" smtClean="0"/>
           </a:p>
         </p:txBody>
       </p:sp>
@@ -6557,8 +7006,21 @@
           <a:p>
             <a:r>
               <a:rPr lang="en-US" dirty="0" smtClean="0"/>
-              <a:t>Smartwatch application must be closed and reopened for every sampling session</a:t>
-            </a:r>
+              <a:t>Smartwatch application must be </a:t>
+            </a:r>
+            <a:r>
+              <a:rPr lang="en-US" b="1" dirty="0" smtClean="0"/>
+              <a:t>closed and reopened </a:t>
+            </a:r>
+            <a:r>
+              <a:rPr lang="en-US" dirty="0" smtClean="0"/>
+              <a:t>for every </a:t>
+            </a:r>
+            <a:r>
+              <a:rPr lang="en-US" dirty="0" smtClean="0"/>
+              <a:t>data collection session</a:t>
+            </a:r>
+            <a:endParaRPr lang="en-US" dirty="0" smtClean="0"/>
           </a:p>
           <a:p>
             <a:pPr lvl="1"/>
@@ -6642,590 +7104,108 @@
           <a:p>
             <a:r>
               <a:rPr lang="en-US" b="1" dirty="0" smtClean="0"/>
-              <a:t>Data Summary</a:t>
+              <a:t>Data Collection Method</a:t>
             </a:r>
             <a:endParaRPr lang="en-US" b="1" dirty="0"/>
           </a:p>
         </p:txBody>
       </p:sp>
-      <p:graphicFrame>
-        <p:nvGraphicFramePr>
-          <p:cNvPr id="4" name="Content Placeholder 3"/>
-          <p:cNvGraphicFramePr>
-            <a:graphicFrameLocks noGrp="1"/>
-          </p:cNvGraphicFramePr>
+      <p:sp>
+        <p:nvSpPr>
+          <p:cNvPr id="3" name="Content Placeholder 2"/>
+          <p:cNvSpPr>
+            <a:spLocks noGrp="1"/>
+          </p:cNvSpPr>
           <p:nvPr>
             <p:ph idx="1"/>
-            <p:extLst>
-              <p:ext uri="{D42A27DB-BD31-4B8C-83A1-F6EECF244321}">
-                <p14:modId xmlns:p14="http://schemas.microsoft.com/office/powerpoint/2010/main" val="264313690"/>
-              </p:ext>
-            </p:extLst>
-          </p:nvPr>
-        </p:nvGraphicFramePr>
-        <p:xfrm>
-          <a:off x="590550" y="1690687"/>
-          <a:ext cx="11182349" cy="3814232"/>
-        </p:xfrm>
-        <a:graphic>
-          <a:graphicData uri="http://schemas.openxmlformats.org/drawingml/2006/table">
-            <a:tbl>
-              <a:tblPr firstRow="1" bandRow="1">
-                <a:tableStyleId>{5C22544A-7EE6-4342-B048-85BDC9FD1C3A}</a:tableStyleId>
-              </a:tblPr>
-              <a:tblGrid>
-                <a:gridCol w="3178656"/>
-                <a:gridCol w="1710167"/>
-                <a:gridCol w="4647146"/>
-                <a:gridCol w="1646380"/>
-              </a:tblGrid>
-              <a:tr h="476779">
-                <a:tc>
-                  <a:txBody>
-                    <a:bodyPr/>
-                    <a:lstStyle/>
-                    <a:p>
-                      <a:pPr algn="ctr"/>
-                      <a:r>
-                        <a:rPr lang="en-US" sz="2400" b="1" dirty="0" smtClean="0"/>
-                        <a:t>Activities</a:t>
-                      </a:r>
-                      <a:endParaRPr lang="en-US" sz="2400" b="1" dirty="0"/>
-                    </a:p>
-                  </a:txBody>
-                  <a:tcPr/>
-                </a:tc>
-                <a:tc>
-                  <a:txBody>
-                    <a:bodyPr/>
-                    <a:lstStyle/>
-                    <a:p>
-                      <a:pPr algn="ctr"/>
-                      <a:r>
-                        <a:rPr lang="en-US" sz="2400" b="1" dirty="0" smtClean="0"/>
-                        <a:t>Duration</a:t>
-                      </a:r>
-                      <a:endParaRPr lang="en-US" sz="2400" b="1" dirty="0"/>
-                    </a:p>
-                  </a:txBody>
-                  <a:tcPr/>
-                </a:tc>
-                <a:tc>
-                  <a:txBody>
-                    <a:bodyPr/>
-                    <a:lstStyle/>
-                    <a:p>
-                      <a:pPr algn="ctr"/>
-                      <a:r>
-                        <a:rPr lang="en-US" sz="2400" b="1" dirty="0" smtClean="0"/>
-                        <a:t>Activities</a:t>
-                      </a:r>
-                      <a:endParaRPr lang="en-US" sz="2400" b="1" dirty="0"/>
-                    </a:p>
-                  </a:txBody>
-                  <a:tcPr/>
-                </a:tc>
-                <a:tc>
-                  <a:txBody>
-                    <a:bodyPr/>
-                    <a:lstStyle/>
-                    <a:p>
-                      <a:pPr algn="ctr"/>
-                      <a:r>
-                        <a:rPr lang="en-US" sz="2400" b="1" dirty="0" smtClean="0"/>
-                        <a:t>Duration</a:t>
-                      </a:r>
-                      <a:endParaRPr lang="en-US" sz="2400" b="1" dirty="0"/>
-                    </a:p>
-                  </a:txBody>
-                  <a:tcPr/>
-                </a:tc>
-              </a:tr>
-              <a:tr h="476779">
-                <a:tc>
-                  <a:txBody>
-                    <a:bodyPr/>
-                    <a:lstStyle/>
-                    <a:p>
-                      <a:r>
-                        <a:rPr lang="en-US" sz="2400" b="1" dirty="0" smtClean="0"/>
-                        <a:t>Walking</a:t>
-                      </a:r>
-                      <a:endParaRPr lang="en-US" sz="2400" b="1" dirty="0"/>
-                    </a:p>
-                  </a:txBody>
-                  <a:tcPr/>
-                </a:tc>
-                <a:tc>
-                  <a:txBody>
-                    <a:bodyPr/>
-                    <a:lstStyle/>
-                    <a:p>
-                      <a:r>
-                        <a:rPr lang="en-US" sz="2400" dirty="0" smtClean="0"/>
-                        <a:t>5 minutes</a:t>
-                      </a:r>
-                      <a:endParaRPr lang="en-US" sz="2400" dirty="0"/>
-                    </a:p>
-                  </a:txBody>
-                  <a:tcPr/>
-                </a:tc>
-                <a:tc>
-                  <a:txBody>
-                    <a:bodyPr/>
-                    <a:lstStyle/>
-                    <a:p>
-                      <a:r>
-                        <a:rPr lang="en-US" sz="2400" b="1" dirty="0" smtClean="0"/>
-                        <a:t>Typing (keyboard, sitting)</a:t>
-                      </a:r>
-                      <a:endParaRPr lang="en-US" sz="2400" b="1" dirty="0"/>
-                    </a:p>
-                  </a:txBody>
-                  <a:tcPr/>
-                </a:tc>
-                <a:tc>
-                  <a:txBody>
-                    <a:bodyPr/>
-                    <a:lstStyle/>
-                    <a:p>
-                      <a:r>
-                        <a:rPr lang="en-US" sz="2400" dirty="0" smtClean="0"/>
-                        <a:t>5 minutes</a:t>
-                      </a:r>
-                      <a:endParaRPr lang="en-US" sz="2400" dirty="0"/>
-                    </a:p>
-                  </a:txBody>
-                  <a:tcPr/>
-                </a:tc>
-              </a:tr>
-              <a:tr h="476779">
-                <a:tc>
-                  <a:txBody>
-                    <a:bodyPr/>
-                    <a:lstStyle/>
-                    <a:p>
-                      <a:r>
-                        <a:rPr lang="en-US" sz="2400" b="1" dirty="0" smtClean="0"/>
-                        <a:t>Running</a:t>
-                      </a:r>
-                      <a:endParaRPr lang="en-US" sz="2400" b="1" dirty="0"/>
-                    </a:p>
-                  </a:txBody>
-                  <a:tcPr/>
-                </a:tc>
-                <a:tc>
-                  <a:txBody>
-                    <a:bodyPr/>
-                    <a:lstStyle/>
-                    <a:p>
-                      <a:r>
-                        <a:rPr lang="en-US" sz="2400" dirty="0" smtClean="0"/>
-                        <a:t>6 minutes</a:t>
-                      </a:r>
-                      <a:endParaRPr lang="en-US" sz="2400" dirty="0"/>
-                    </a:p>
-                  </a:txBody>
-                  <a:tcPr/>
-                </a:tc>
-                <a:tc>
-                  <a:txBody>
-                    <a:bodyPr/>
-                    <a:lstStyle/>
-                    <a:p>
-                      <a:r>
-                        <a:rPr lang="en-US" sz="2400" b="1" dirty="0" smtClean="0"/>
-                        <a:t>Writing (pencil,</a:t>
-                      </a:r>
-                      <a:r>
-                        <a:rPr lang="en-US" sz="2400" b="1" baseline="0" dirty="0" smtClean="0"/>
-                        <a:t> sitting)</a:t>
-                      </a:r>
-                      <a:endParaRPr lang="en-US" sz="2400" b="1" dirty="0"/>
-                    </a:p>
-                  </a:txBody>
-                  <a:tcPr/>
-                </a:tc>
-                <a:tc>
-                  <a:txBody>
-                    <a:bodyPr/>
-                    <a:lstStyle/>
-                    <a:p>
-                      <a:r>
-                        <a:rPr lang="en-US" sz="2400" dirty="0" smtClean="0"/>
-                        <a:t>5 minutes</a:t>
-                      </a:r>
-                      <a:endParaRPr lang="en-US" sz="2400" dirty="0"/>
-                    </a:p>
-                  </a:txBody>
-                  <a:tcPr/>
-                </a:tc>
-              </a:tr>
-              <a:tr h="476779">
-                <a:tc>
-                  <a:txBody>
-                    <a:bodyPr/>
-                    <a:lstStyle/>
-                    <a:p>
-                      <a:r>
-                        <a:rPr lang="en-US" sz="2400" b="1" dirty="0" smtClean="0"/>
-                        <a:t>Lying</a:t>
-                      </a:r>
-                      <a:endParaRPr lang="en-US" sz="2400" b="1" dirty="0"/>
-                    </a:p>
-                  </a:txBody>
-                  <a:tcPr/>
-                </a:tc>
-                <a:tc>
-                  <a:txBody>
-                    <a:bodyPr/>
-                    <a:lstStyle/>
-                    <a:p>
-                      <a:r>
-                        <a:rPr lang="en-US" sz="2400" dirty="0" smtClean="0"/>
-                        <a:t>5 minutes</a:t>
-                      </a:r>
-                      <a:endParaRPr lang="en-US" sz="2400" dirty="0"/>
-                    </a:p>
-                  </a:txBody>
-                  <a:tcPr/>
-                </a:tc>
-                <a:tc>
-                  <a:txBody>
-                    <a:bodyPr/>
-                    <a:lstStyle/>
-                    <a:p>
-                      <a:r>
-                        <a:rPr lang="en-US" sz="2400" b="1" dirty="0" smtClean="0"/>
-                        <a:t>Reading (book, sitting)</a:t>
-                      </a:r>
-                      <a:endParaRPr lang="en-US" sz="2400" b="1" dirty="0"/>
-                    </a:p>
-                  </a:txBody>
-                  <a:tcPr/>
-                </a:tc>
-                <a:tc>
-                  <a:txBody>
-                    <a:bodyPr/>
-                    <a:lstStyle/>
-                    <a:p>
-                      <a:r>
-                        <a:rPr lang="en-US" sz="2400" dirty="0" smtClean="0"/>
-                        <a:t>6 minutes</a:t>
-                      </a:r>
-                      <a:endParaRPr lang="en-US" sz="2400" dirty="0"/>
-                    </a:p>
-                  </a:txBody>
-                  <a:tcPr/>
-                </a:tc>
-              </a:tr>
-              <a:tr h="476779">
-                <a:tc>
-                  <a:txBody>
-                    <a:bodyPr/>
-                    <a:lstStyle/>
-                    <a:p>
-                      <a:r>
-                        <a:rPr lang="en-US" sz="2400" b="1" dirty="0" smtClean="0"/>
-                        <a:t>Sitting</a:t>
-                      </a:r>
-                    </a:p>
-                  </a:txBody>
-                  <a:tcPr/>
-                </a:tc>
-                <a:tc>
-                  <a:txBody>
-                    <a:bodyPr/>
-                    <a:lstStyle/>
-                    <a:p>
-                      <a:r>
-                        <a:rPr lang="en-US" sz="2400" dirty="0" smtClean="0"/>
-                        <a:t>6 minutes</a:t>
-                      </a:r>
-                      <a:endParaRPr lang="en-US" sz="2400" dirty="0"/>
-                    </a:p>
-                  </a:txBody>
-                  <a:tcPr/>
-                </a:tc>
-                <a:tc>
-                  <a:txBody>
-                    <a:bodyPr/>
-                    <a:lstStyle/>
-                    <a:p>
-                      <a:r>
-                        <a:rPr lang="en-US" sz="2400" b="1" dirty="0" smtClean="0"/>
-                        <a:t>Eating (sitting)</a:t>
-                      </a:r>
-                      <a:endParaRPr lang="en-US" sz="2400" b="1" dirty="0"/>
-                    </a:p>
-                  </a:txBody>
-                  <a:tcPr/>
-                </a:tc>
-                <a:tc>
-                  <a:txBody>
-                    <a:bodyPr/>
-                    <a:lstStyle/>
-                    <a:p>
-                      <a:r>
-                        <a:rPr lang="en-US" sz="2400" dirty="0" smtClean="0"/>
-                        <a:t>4.5 minutes</a:t>
-                      </a:r>
-                      <a:endParaRPr lang="en-US" sz="2400" dirty="0"/>
-                    </a:p>
-                  </a:txBody>
-                  <a:tcPr/>
-                </a:tc>
-              </a:tr>
-              <a:tr h="476779">
-                <a:tc>
-                  <a:txBody>
-                    <a:bodyPr/>
-                    <a:lstStyle/>
-                    <a:p>
-                      <a:r>
-                        <a:rPr lang="en-US" sz="2400" b="1" dirty="0" smtClean="0"/>
-                        <a:t>Standing</a:t>
-                      </a:r>
-                      <a:endParaRPr lang="en-US" sz="2400" b="1" dirty="0"/>
-                    </a:p>
-                  </a:txBody>
-                  <a:tcPr/>
-                </a:tc>
-                <a:tc>
-                  <a:txBody>
-                    <a:bodyPr/>
-                    <a:lstStyle/>
-                    <a:p>
-                      <a:r>
-                        <a:rPr lang="en-US" sz="2400" dirty="0" smtClean="0"/>
-                        <a:t>6 minutes</a:t>
-                      </a:r>
-                      <a:endParaRPr lang="en-US" sz="2400" dirty="0"/>
-                    </a:p>
-                  </a:txBody>
-                  <a:tcPr/>
-                </a:tc>
-                <a:tc>
-                  <a:txBody>
-                    <a:bodyPr/>
-                    <a:lstStyle/>
-                    <a:p>
-                      <a:pPr marL="0" marR="0" indent="0" algn="l" defTabSz="914400" rtl="0" eaLnBrk="1" fontAlgn="auto" latinLnBrk="0" hangingPunct="1">
-                        <a:lnSpc>
-                          <a:spcPct val="100000"/>
-                        </a:lnSpc>
-                        <a:spcBef>
-                          <a:spcPts val="0"/>
-                        </a:spcBef>
-                        <a:spcAft>
-                          <a:spcPts val="0"/>
-                        </a:spcAft>
-                        <a:buClrTx/>
-                        <a:buSzTx/>
-                        <a:buFontTx/>
-                        <a:buNone/>
-                        <a:tabLst/>
-                        <a:defRPr/>
-                      </a:pPr>
-                      <a:r>
-                        <a:rPr lang="en-US" sz="2400" b="1" dirty="0" smtClean="0"/>
-                        <a:t>Folding (clothes, standing)</a:t>
-                      </a:r>
-                    </a:p>
-                  </a:txBody>
-                  <a:tcPr/>
-                </a:tc>
-                <a:tc>
-                  <a:txBody>
-                    <a:bodyPr/>
-                    <a:lstStyle/>
-                    <a:p>
-                      <a:r>
-                        <a:rPr lang="en-US" sz="2400" dirty="0" smtClean="0"/>
-                        <a:t>6</a:t>
-                      </a:r>
-                      <a:r>
-                        <a:rPr lang="en-US" sz="2400" baseline="0" dirty="0" smtClean="0"/>
-                        <a:t> minutes</a:t>
-                      </a:r>
-                      <a:endParaRPr lang="en-US" sz="2400" dirty="0"/>
-                    </a:p>
-                  </a:txBody>
-                  <a:tcPr/>
-                </a:tc>
-              </a:tr>
-              <a:tr h="476779">
-                <a:tc>
-                  <a:txBody>
-                    <a:bodyPr/>
-                    <a:lstStyle/>
-                    <a:p>
-                      <a:r>
-                        <a:rPr lang="en-US" sz="2400" b="1" dirty="0" smtClean="0"/>
-                        <a:t>Going Upstairs</a:t>
-                      </a:r>
-                      <a:endParaRPr lang="en-US" sz="2400" b="1" dirty="0"/>
-                    </a:p>
-                  </a:txBody>
-                  <a:tcPr/>
-                </a:tc>
-                <a:tc>
-                  <a:txBody>
-                    <a:bodyPr/>
-                    <a:lstStyle/>
-                    <a:p>
-                      <a:r>
-                        <a:rPr lang="en-US" sz="2400" dirty="0" smtClean="0"/>
-                        <a:t>6</a:t>
-                      </a:r>
-                      <a:r>
-                        <a:rPr lang="en-US" sz="2400" smtClean="0"/>
-                        <a:t> </a:t>
-                      </a:r>
-                      <a:r>
-                        <a:rPr lang="en-US" sz="2400" dirty="0" smtClean="0"/>
-                        <a:t>minutes</a:t>
-                      </a:r>
-                      <a:endParaRPr lang="en-US" sz="2400" dirty="0"/>
-                    </a:p>
-                  </a:txBody>
-                  <a:tcPr/>
-                </a:tc>
-                <a:tc>
-                  <a:txBody>
-                    <a:bodyPr/>
-                    <a:lstStyle/>
-                    <a:p>
-                      <a:pPr marL="0" marR="0" indent="0" algn="l" defTabSz="914400" rtl="0" eaLnBrk="1" fontAlgn="auto" latinLnBrk="0" hangingPunct="1">
-                        <a:lnSpc>
-                          <a:spcPct val="100000"/>
-                        </a:lnSpc>
-                        <a:spcBef>
-                          <a:spcPts val="0"/>
-                        </a:spcBef>
-                        <a:spcAft>
-                          <a:spcPts val="0"/>
-                        </a:spcAft>
-                        <a:buClrTx/>
-                        <a:buSzTx/>
-                        <a:buFontTx/>
-                        <a:buNone/>
-                        <a:tabLst/>
-                        <a:defRPr/>
-                      </a:pPr>
-                      <a:r>
-                        <a:rPr lang="en-US" sz="2400" b="1" dirty="0" smtClean="0"/>
-                        <a:t>Sweeping the Floor</a:t>
-                      </a:r>
-                    </a:p>
-                  </a:txBody>
-                  <a:tcPr/>
-                </a:tc>
-                <a:tc>
-                  <a:txBody>
-                    <a:bodyPr/>
-                    <a:lstStyle/>
-                    <a:p>
-                      <a:r>
-                        <a:rPr lang="en-US" sz="2400" dirty="0" smtClean="0"/>
-                        <a:t>6 minutes</a:t>
-                      </a:r>
-                      <a:endParaRPr lang="en-US" sz="2400" dirty="0"/>
-                    </a:p>
-                  </a:txBody>
-                  <a:tcPr/>
-                </a:tc>
-              </a:tr>
-              <a:tr h="476779">
-                <a:tc>
-                  <a:txBody>
-                    <a:bodyPr/>
-                    <a:lstStyle/>
-                    <a:p>
-                      <a:r>
-                        <a:rPr lang="en-US" sz="2400" b="1" dirty="0" smtClean="0"/>
-                        <a:t>Going Downstairs</a:t>
-                      </a:r>
-                      <a:endParaRPr lang="en-US" sz="2400" b="1" dirty="0"/>
-                    </a:p>
-                  </a:txBody>
-                  <a:tcPr/>
-                </a:tc>
-                <a:tc>
-                  <a:txBody>
-                    <a:bodyPr/>
-                    <a:lstStyle/>
-                    <a:p>
-                      <a:r>
-                        <a:rPr lang="en-US" sz="2400" dirty="0" smtClean="0"/>
-                        <a:t>6</a:t>
-                      </a:r>
-                      <a:r>
-                        <a:rPr lang="en-US" sz="2400" smtClean="0"/>
-                        <a:t> </a:t>
-                      </a:r>
-                      <a:r>
-                        <a:rPr lang="en-US" sz="2400" dirty="0" smtClean="0"/>
-                        <a:t>minutes</a:t>
-                      </a:r>
-                      <a:endParaRPr lang="en-US" sz="2400" dirty="0"/>
-                    </a:p>
-                  </a:txBody>
-                  <a:tcPr/>
-                </a:tc>
-                <a:tc>
-                  <a:txBody>
-                    <a:bodyPr/>
-                    <a:lstStyle/>
-                    <a:p>
-                      <a:pPr marL="0" marR="0" indent="0" algn="l" defTabSz="914400" rtl="0" eaLnBrk="1" fontAlgn="auto" latinLnBrk="0" hangingPunct="1">
-                        <a:lnSpc>
-                          <a:spcPct val="100000"/>
-                        </a:lnSpc>
-                        <a:spcBef>
-                          <a:spcPts val="0"/>
-                        </a:spcBef>
-                        <a:spcAft>
-                          <a:spcPts val="0"/>
-                        </a:spcAft>
-                        <a:buClrTx/>
-                        <a:buSzTx/>
-                        <a:buFontTx/>
-                        <a:buNone/>
-                        <a:tabLst/>
-                        <a:defRPr/>
-                      </a:pPr>
-                      <a:r>
-                        <a:rPr lang="en-US" sz="2400" b="1" dirty="0" smtClean="0"/>
-                        <a:t>Brushing (standing)</a:t>
-                      </a:r>
-                    </a:p>
-                  </a:txBody>
-                  <a:tcPr/>
-                </a:tc>
-                <a:tc>
-                  <a:txBody>
-                    <a:bodyPr/>
-                    <a:lstStyle/>
-                    <a:p>
-                      <a:r>
-                        <a:rPr lang="en-US" sz="2400" dirty="0" smtClean="0"/>
-                        <a:t>6 minutes</a:t>
-                      </a:r>
-                      <a:endParaRPr lang="en-US" sz="2400" dirty="0"/>
-                    </a:p>
-                  </a:txBody>
-                  <a:tcPr/>
-                </a:tc>
-              </a:tr>
-            </a:tbl>
-          </a:graphicData>
-        </a:graphic>
-      </p:graphicFrame>
+          </p:nvPr>
+        </p:nvSpPr>
+        <p:spPr>
+          <a:xfrm>
+            <a:off x="838200" y="1697288"/>
+            <a:ext cx="10515600" cy="5184776"/>
+          </a:xfrm>
+        </p:spPr>
+        <p:txBody>
+          <a:bodyPr>
+            <a:normAutofit/>
+          </a:bodyPr>
+          <a:lstStyle/>
+          <a:p>
+            <a:r>
+              <a:rPr lang="en-US" dirty="0" smtClean="0"/>
+              <a:t>Smartwatch is used on the right hand</a:t>
+            </a:r>
+          </a:p>
+          <a:p>
+            <a:r>
+              <a:rPr lang="en-US" dirty="0" smtClean="0"/>
+              <a:t>Smartphone is always in the right pocket, facing down and outwards</a:t>
+            </a:r>
+          </a:p>
+          <a:p>
+            <a:r>
+              <a:rPr lang="en-US" dirty="0" smtClean="0"/>
+              <a:t>For activities with </a:t>
+            </a:r>
+            <a:r>
+              <a:rPr lang="en-US" b="1" dirty="0" smtClean="0"/>
+              <a:t>multiple data collection</a:t>
+            </a:r>
+            <a:r>
+              <a:rPr lang="en-US" dirty="0" smtClean="0"/>
+              <a:t>:</a:t>
+            </a:r>
+          </a:p>
+          <a:p>
+            <a:pPr lvl="1"/>
+            <a:r>
+              <a:rPr lang="en-US" dirty="0" smtClean="0"/>
+              <a:t>Each data collection session will generate one set of data files</a:t>
+            </a:r>
+          </a:p>
+          <a:p>
+            <a:pPr lvl="1"/>
+            <a:r>
+              <a:rPr lang="en-US" dirty="0" smtClean="0"/>
+              <a:t>Conduct sampling and data windowing</a:t>
+            </a:r>
+          </a:p>
+          <a:p>
+            <a:pPr lvl="1"/>
+            <a:r>
+              <a:rPr lang="en-US" dirty="0" smtClean="0"/>
+              <a:t>Merge the windows into one file (combined by sensor source)</a:t>
+            </a:r>
+          </a:p>
+          <a:p>
+            <a:pPr lvl="1"/>
+            <a:r>
+              <a:rPr lang="en-US" dirty="0" smtClean="0"/>
+              <a:t>Generate features for each window (data is still separated between Smartphone and Smartwatch)</a:t>
+            </a:r>
+          </a:p>
+          <a:p>
+            <a:pPr lvl="1"/>
+            <a:r>
+              <a:rPr lang="en-US" dirty="0" smtClean="0"/>
+              <a:t>Combine generated features into one file for each activity type</a:t>
+            </a:r>
+          </a:p>
+          <a:p>
+            <a:pPr lvl="1"/>
+            <a:r>
+              <a:rPr lang="en-US" dirty="0" smtClean="0"/>
+              <a:t>Combine all activity data into one huge file (containing data from multiple activity</a:t>
+            </a:r>
+            <a:endParaRPr lang="en-US" dirty="0"/>
+          </a:p>
+        </p:txBody>
+      </p:sp>
     </p:spTree>
     <p:extLst>
       <p:ext uri="{BB962C8B-B14F-4D97-AF65-F5344CB8AC3E}">
-        <p14:creationId xmlns:p14="http://schemas.microsoft.com/office/powerpoint/2010/main" val="1579800235"/>
+        <p14:creationId xmlns:p14="http://schemas.microsoft.com/office/powerpoint/2010/main" val="331845677"/>
       </p:ext>
     </p:extLst>
   </p:cSld>
@@ -7262,12 +7242,7 @@
             <p:ph type="title"/>
           </p:nvPr>
         </p:nvSpPr>
-        <p:spPr>
-          <a:xfrm>
-            <a:off x="838200" y="534987"/>
-            <a:ext cx="10515600" cy="1325563"/>
-          </a:xfrm>
-        </p:spPr>
+        <p:spPr/>
         <p:txBody>
           <a:bodyPr/>
           <a:lstStyle/>
@@ -7280,60 +7255,23 @@
           </a:p>
         </p:txBody>
       </p:sp>
-      <p:sp>
-        <p:nvSpPr>
-          <p:cNvPr id="3" name="Content Placeholder 2"/>
-          <p:cNvSpPr>
-            <a:spLocks noGrp="1"/>
-          </p:cNvSpPr>
-          <p:nvPr>
-            <p:ph idx="1"/>
-          </p:nvPr>
-        </p:nvSpPr>
-        <p:spPr/>
-        <p:txBody>
-          <a:bodyPr/>
-          <a:lstStyle/>
-          <a:p>
-            <a:r>
-              <a:rPr lang="en-US" dirty="0" smtClean="0"/>
-              <a:t>10 Hz, 1s window size, half-overlapping: </a:t>
-            </a:r>
-            <a:r>
-              <a:rPr lang="en-US" b="1" dirty="0" smtClean="0"/>
-              <a:t>8695 </a:t>
-            </a:r>
-            <a:r>
-              <a:rPr lang="en-US" dirty="0" smtClean="0"/>
-              <a:t>data </a:t>
-            </a:r>
-            <a:r>
-              <a:rPr lang="en-US" dirty="0" smtClean="0"/>
-              <a:t>points</a:t>
-            </a:r>
-            <a:endParaRPr lang="en-US" dirty="0"/>
-          </a:p>
-          <a:p>
-            <a:endParaRPr lang="en-US" dirty="0" smtClean="0"/>
-          </a:p>
-        </p:txBody>
-      </p:sp>
       <p:graphicFrame>
         <p:nvGraphicFramePr>
-          <p:cNvPr id="5" name="Content Placeholder 3"/>
+          <p:cNvPr id="4" name="Content Placeholder 3"/>
           <p:cNvGraphicFramePr>
-            <a:graphicFrameLocks/>
+            <a:graphicFrameLocks noGrp="1"/>
           </p:cNvGraphicFramePr>
           <p:nvPr>
+            <p:ph idx="1"/>
             <p:extLst>
               <p:ext uri="{D42A27DB-BD31-4B8C-83A1-F6EECF244321}">
-                <p14:modId xmlns:p14="http://schemas.microsoft.com/office/powerpoint/2010/main" val="879928922"/>
+                <p14:modId xmlns:p14="http://schemas.microsoft.com/office/powerpoint/2010/main" val="264313690"/>
               </p:ext>
             </p:extLst>
           </p:nvPr>
         </p:nvGraphicFramePr>
         <p:xfrm>
-          <a:off x="504825" y="2497668"/>
+          <a:off x="590550" y="1690687"/>
           <a:ext cx="11182349" cy="3814232"/>
         </p:xfrm>
         <a:graphic>
@@ -7343,10 +7281,10 @@
                 <a:tableStyleId>{5C22544A-7EE6-4342-B048-85BDC9FD1C3A}</a:tableStyleId>
               </a:tblPr>
               <a:tblGrid>
-                <a:gridCol w="2714625"/>
-                <a:gridCol w="2174198"/>
-                <a:gridCol w="3769402"/>
-                <a:gridCol w="2524124"/>
+                <a:gridCol w="3178656"/>
+                <a:gridCol w="1710167"/>
+                <a:gridCol w="4647146"/>
+                <a:gridCol w="1646380"/>
               </a:tblGrid>
               <a:tr h="476779">
                 <a:tc>
@@ -7371,8 +7309,8 @@
                     <a:p>
                       <a:pPr algn="ctr"/>
                       <a:r>
-                        <a:rPr lang="en-US" sz="2400" b="1" baseline="0" dirty="0" smtClean="0"/>
-                        <a:t>Data Points</a:t>
+                        <a:rPr lang="en-US" sz="2400" b="1" dirty="0" smtClean="0"/>
+                        <a:t>Duration</a:t>
                       </a:r>
                       <a:endParaRPr lang="en-US" sz="2400" b="1" dirty="0"/>
                     </a:p>
@@ -7430,10 +7368,9 @@
                     <a:bodyPr/>
                     <a:lstStyle/>
                     <a:p>
-                      <a:pPr algn="ctr"/>
                       <a:r>
                         <a:rPr lang="en-US" sz="2400" dirty="0" smtClean="0"/>
-                        <a:t>578</a:t>
+                        <a:t>5 minutes</a:t>
                       </a:r>
                       <a:endParaRPr lang="en-US" sz="2400" dirty="0"/>
                     </a:p>
@@ -7459,10 +7396,9 @@
                     <a:bodyPr/>
                     <a:lstStyle/>
                     <a:p>
-                      <a:pPr algn="ctr"/>
                       <a:r>
                         <a:rPr lang="en-US" sz="2400" dirty="0" smtClean="0"/>
-                        <a:t>518</a:t>
+                        <a:t>5 minutes</a:t>
                       </a:r>
                       <a:endParaRPr lang="en-US" sz="2400" dirty="0"/>
                     </a:p>
@@ -7490,10 +7426,9 @@
                     <a:bodyPr/>
                     <a:lstStyle/>
                     <a:p>
-                      <a:pPr algn="ctr"/>
                       <a:r>
                         <a:rPr lang="en-US" sz="2400" dirty="0" smtClean="0"/>
-                        <a:t>674</a:t>
+                        <a:t>6 minutes</a:t>
                       </a:r>
                       <a:endParaRPr lang="en-US" sz="2400" dirty="0"/>
                     </a:p>
@@ -7523,10 +7458,9 @@
                     <a:bodyPr/>
                     <a:lstStyle/>
                     <a:p>
-                      <a:pPr algn="ctr"/>
                       <a:r>
                         <a:rPr lang="en-US" sz="2400" dirty="0" smtClean="0"/>
-                        <a:t>579</a:t>
+                        <a:t>5 minutes</a:t>
                       </a:r>
                       <a:endParaRPr lang="en-US" sz="2400" dirty="0"/>
                     </a:p>
@@ -7554,10 +7488,9 @@
                     <a:bodyPr/>
                     <a:lstStyle/>
                     <a:p>
-                      <a:pPr algn="ctr"/>
                       <a:r>
                         <a:rPr lang="en-US" sz="2400" dirty="0" smtClean="0"/>
-                        <a:t>518</a:t>
+                        <a:t>5 minutes</a:t>
                       </a:r>
                       <a:endParaRPr lang="en-US" sz="2400" dirty="0"/>
                     </a:p>
@@ -7583,10 +7516,9 @@
                     <a:bodyPr/>
                     <a:lstStyle/>
                     <a:p>
-                      <a:pPr algn="ctr"/>
                       <a:r>
                         <a:rPr lang="en-US" sz="2400" dirty="0" smtClean="0"/>
-                        <a:t>651</a:t>
+                        <a:t>6 minutes</a:t>
                       </a:r>
                       <a:endParaRPr lang="en-US" sz="2400" dirty="0"/>
                     </a:p>
@@ -7613,10 +7545,9 @@
                     <a:bodyPr/>
                     <a:lstStyle/>
                     <a:p>
-                      <a:pPr algn="ctr"/>
                       <a:r>
                         <a:rPr lang="en-US" sz="2400" dirty="0" smtClean="0"/>
-                        <a:t>676</a:t>
+                        <a:t>6 minutes</a:t>
                       </a:r>
                       <a:endParaRPr lang="en-US" sz="2400" dirty="0"/>
                     </a:p>
@@ -7642,10 +7573,9 @@
                     <a:bodyPr/>
                     <a:lstStyle/>
                     <a:p>
-                      <a:pPr algn="ctr"/>
                       <a:r>
                         <a:rPr lang="en-US" sz="2400" dirty="0" smtClean="0"/>
-                        <a:t>516</a:t>
+                        <a:t>4.5 minutes</a:t>
                       </a:r>
                       <a:endParaRPr lang="en-US" sz="2400" dirty="0"/>
                     </a:p>
@@ -7673,10 +7603,9 @@
                     <a:bodyPr/>
                     <a:lstStyle/>
                     <a:p>
-                      <a:pPr algn="ctr"/>
                       <a:r>
                         <a:rPr lang="en-US" sz="2400" dirty="0" smtClean="0"/>
-                        <a:t>676</a:t>
+                        <a:t>6 minutes</a:t>
                       </a:r>
                       <a:endParaRPr lang="en-US" sz="2400" dirty="0"/>
                     </a:p>
@@ -7718,10 +7647,13 @@
                     <a:bodyPr/>
                     <a:lstStyle/>
                     <a:p>
-                      <a:pPr algn="ctr"/>
                       <a:r>
                         <a:rPr lang="en-US" sz="2400" dirty="0" smtClean="0"/>
-                        <a:t>676</a:t>
+                        <a:t>6</a:t>
+                      </a:r>
+                      <a:r>
+                        <a:rPr lang="en-US" sz="2400" baseline="0" dirty="0" smtClean="0"/>
+                        <a:t> minutes</a:t>
                       </a:r>
                       <a:endParaRPr lang="en-US" sz="2400" dirty="0"/>
                     </a:p>
@@ -7749,10 +7681,17 @@
                     <a:bodyPr/>
                     <a:lstStyle/>
                     <a:p>
-                      <a:pPr algn="ctr"/>
                       <a:r>
                         <a:rPr lang="en-US" sz="2400" dirty="0" smtClean="0"/>
-                        <a:t>645</a:t>
+                        <a:t>6</a:t>
+                      </a:r>
+                      <a:r>
+                        <a:rPr lang="en-US" sz="2400" smtClean="0"/>
+                        <a:t> </a:t>
+                      </a:r>
+                      <a:r>
+                        <a:rPr lang="en-US" sz="2400" dirty="0" smtClean="0"/>
+                        <a:t>minutes</a:t>
                       </a:r>
                       <a:endParaRPr lang="en-US" sz="2400" dirty="0"/>
                     </a:p>
@@ -7794,10 +7733,9 @@
                     <a:bodyPr/>
                     <a:lstStyle/>
                     <a:p>
-                      <a:pPr algn="ctr"/>
                       <a:r>
                         <a:rPr lang="en-US" sz="2400" dirty="0" smtClean="0"/>
-                        <a:t>676</a:t>
+                        <a:t>6 minutes</a:t>
                       </a:r>
                       <a:endParaRPr lang="en-US" sz="2400" dirty="0"/>
                     </a:p>
@@ -7825,10 +7763,17 @@
                     <a:bodyPr/>
                     <a:lstStyle/>
                     <a:p>
-                      <a:pPr algn="ctr"/>
                       <a:r>
                         <a:rPr lang="en-US" sz="2400" dirty="0" smtClean="0"/>
-                        <a:t>642</a:t>
+                        <a:t>6</a:t>
+                      </a:r>
+                      <a:r>
+                        <a:rPr lang="en-US" sz="2400" smtClean="0"/>
+                        <a:t> </a:t>
+                      </a:r>
+                      <a:r>
+                        <a:rPr lang="en-US" sz="2400" dirty="0" smtClean="0"/>
+                        <a:t>minutes</a:t>
                       </a:r>
                       <a:endParaRPr lang="en-US" sz="2400" dirty="0"/>
                     </a:p>
@@ -7870,10 +7815,9 @@
                     <a:bodyPr/>
                     <a:lstStyle/>
                     <a:p>
-                      <a:pPr algn="ctr"/>
                       <a:r>
                         <a:rPr lang="en-US" sz="2400" dirty="0" smtClean="0"/>
-                        <a:t>670</a:t>
+                        <a:t>6 minutes</a:t>
                       </a:r>
                       <a:endParaRPr lang="en-US" sz="2400" dirty="0"/>
                     </a:p>
@@ -7888,13 +7832,20 @@
     </p:spTree>
     <p:extLst>
       <p:ext uri="{BB962C8B-B14F-4D97-AF65-F5344CB8AC3E}">
-        <p14:creationId xmlns:p14="http://schemas.microsoft.com/office/powerpoint/2010/main" val="1761208753"/>
+        <p14:creationId xmlns:p14="http://schemas.microsoft.com/office/powerpoint/2010/main" val="1579800235"/>
       </p:ext>
     </p:extLst>
   </p:cSld>
   <p:clrMapOvr>
     <a:masterClrMapping/>
   </p:clrMapOvr>
+  <p:timing>
+    <p:tnLst>
+      <p:par>
+        <p:cTn id="1" dur="indefinite" restart="never" nodeType="tmRoot"/>
+      </p:par>
+    </p:tnLst>
+  </p:timing>
 </p:sld>
 </file>
 
@@ -7960,15 +7911,11 @@
           <a:p>
             <a:r>
               <a:rPr lang="en-US" dirty="0" smtClean="0"/>
-              <a:t>10 Hz, 2s window size, half-overlapping: </a:t>
+              <a:t>10 Hz, 1s window size, half-overlapping: </a:t>
             </a:r>
             <a:r>
               <a:rPr lang="en-US" b="1" dirty="0" smtClean="0"/>
-              <a:t>4327</a:t>
-            </a:r>
-            <a:r>
-              <a:rPr lang="en-US" dirty="0" smtClean="0"/>
-              <a:t> </a:t>
+              <a:t>8695 </a:t>
             </a:r>
             <a:r>
               <a:rPr lang="en-US" dirty="0" smtClean="0"/>
@@ -7990,7 +7937,7 @@
           <p:nvPr>
             <p:extLst>
               <p:ext uri="{D42A27DB-BD31-4B8C-83A1-F6EECF244321}">
-                <p14:modId xmlns:p14="http://schemas.microsoft.com/office/powerpoint/2010/main" val="1336355020"/>
+                <p14:modId xmlns:p14="http://schemas.microsoft.com/office/powerpoint/2010/main" val="1844090079"/>
               </p:ext>
             </p:extLst>
           </p:nvPr>
@@ -8065,7 +8012,11 @@
                       <a:pPr algn="ctr"/>
                       <a:r>
                         <a:rPr lang="en-US" sz="2400" b="1" dirty="0" smtClean="0"/>
-                        <a:t>Duration</a:t>
+                        <a:t>Data</a:t>
+                      </a:r>
+                      <a:r>
+                        <a:rPr lang="en-US" sz="2400" b="1" baseline="0" dirty="0" smtClean="0"/>
+                        <a:t> Points</a:t>
                       </a:r>
                       <a:endParaRPr lang="en-US" sz="2400" b="1" dirty="0"/>
                     </a:p>
@@ -8096,7 +8047,7 @@
                       <a:pPr algn="ctr"/>
                       <a:r>
                         <a:rPr lang="en-US" sz="2400" dirty="0" smtClean="0"/>
-                        <a:t>288</a:t>
+                        <a:t>578</a:t>
                       </a:r>
                       <a:endParaRPr lang="en-US" sz="2400" dirty="0"/>
                     </a:p>
@@ -8125,7 +8076,7 @@
                       <a:pPr algn="ctr"/>
                       <a:r>
                         <a:rPr lang="en-US" sz="2400" dirty="0" smtClean="0"/>
-                        <a:t>258</a:t>
+                        <a:t>518</a:t>
                       </a:r>
                       <a:endParaRPr lang="en-US" sz="2400" dirty="0"/>
                     </a:p>
@@ -8156,7 +8107,7 @@
                       <a:pPr algn="ctr"/>
                       <a:r>
                         <a:rPr lang="en-US" sz="2400" dirty="0" smtClean="0"/>
-                        <a:t>336</a:t>
+                        <a:t>674</a:t>
                       </a:r>
                       <a:endParaRPr lang="en-US" sz="2400" dirty="0"/>
                     </a:p>
@@ -8189,7 +8140,7 @@
                       <a:pPr algn="ctr"/>
                       <a:r>
                         <a:rPr lang="en-US" sz="2400" dirty="0" smtClean="0"/>
-                        <a:t>289</a:t>
+                        <a:t>579</a:t>
                       </a:r>
                       <a:endParaRPr lang="en-US" sz="2400" dirty="0"/>
                     </a:p>
@@ -8220,7 +8171,7 @@
                       <a:pPr algn="ctr"/>
                       <a:r>
                         <a:rPr lang="en-US" sz="2400" dirty="0" smtClean="0"/>
-                        <a:t>258</a:t>
+                        <a:t>518</a:t>
                       </a:r>
                       <a:endParaRPr lang="en-US" sz="2400" dirty="0"/>
                     </a:p>
@@ -8249,7 +8200,7 @@
                       <a:pPr algn="ctr"/>
                       <a:r>
                         <a:rPr lang="en-US" sz="2400" dirty="0" smtClean="0"/>
-                        <a:t>324</a:t>
+                        <a:t>651</a:t>
                       </a:r>
                       <a:endParaRPr lang="en-US" sz="2400" dirty="0"/>
                     </a:p>
@@ -8279,7 +8230,7 @@
                       <a:pPr algn="ctr"/>
                       <a:r>
                         <a:rPr lang="en-US" sz="2400" dirty="0" smtClean="0"/>
-                        <a:t>336</a:t>
+                        <a:t>676</a:t>
                       </a:r>
                       <a:endParaRPr lang="en-US" sz="2400" dirty="0"/>
                     </a:p>
@@ -8308,7 +8259,7 @@
                       <a:pPr algn="ctr"/>
                       <a:r>
                         <a:rPr lang="en-US" sz="2400" dirty="0" smtClean="0"/>
-                        <a:t>257</a:t>
+                        <a:t>516</a:t>
                       </a:r>
                       <a:endParaRPr lang="en-US" sz="2400" dirty="0"/>
                     </a:p>
@@ -8339,7 +8290,7 @@
                       <a:pPr algn="ctr"/>
                       <a:r>
                         <a:rPr lang="en-US" sz="2400" dirty="0" smtClean="0"/>
-                        <a:t>336</a:t>
+                        <a:t>676</a:t>
                       </a:r>
                       <a:endParaRPr lang="en-US" sz="2400" dirty="0"/>
                     </a:p>
@@ -8384,7 +8335,7 @@
                       <a:pPr algn="ctr"/>
                       <a:r>
                         <a:rPr lang="en-US" sz="2400" dirty="0" smtClean="0"/>
-                        <a:t>336</a:t>
+                        <a:t>676</a:t>
                       </a:r>
                       <a:endParaRPr lang="en-US" sz="2400" dirty="0"/>
                     </a:p>
@@ -8415,7 +8366,7 @@
                       <a:pPr algn="ctr"/>
                       <a:r>
                         <a:rPr lang="en-US" sz="2400" dirty="0" smtClean="0"/>
-                        <a:t>321</a:t>
+                        <a:t>645</a:t>
                       </a:r>
                       <a:endParaRPr lang="en-US" sz="2400" dirty="0"/>
                     </a:p>
@@ -8460,7 +8411,7 @@
                       <a:pPr algn="ctr"/>
                       <a:r>
                         <a:rPr lang="en-US" sz="2400" dirty="0" smtClean="0"/>
-                        <a:t>336</a:t>
+                        <a:t>676</a:t>
                       </a:r>
                       <a:endParaRPr lang="en-US" sz="2400" dirty="0"/>
                     </a:p>
@@ -8491,7 +8442,7 @@
                       <a:pPr algn="ctr"/>
                       <a:r>
                         <a:rPr lang="en-US" sz="2400" dirty="0" smtClean="0"/>
-                        <a:t>318</a:t>
+                        <a:t>642</a:t>
                       </a:r>
                       <a:endParaRPr lang="en-US" sz="2400" dirty="0"/>
                     </a:p>
@@ -8536,7 +8487,7 @@
                       <a:pPr algn="ctr"/>
                       <a:r>
                         <a:rPr lang="en-US" sz="2400" dirty="0" smtClean="0"/>
-                        <a:t>334</a:t>
+                        <a:t>670</a:t>
                       </a:r>
                       <a:endParaRPr lang="en-US" sz="2400" dirty="0"/>
                     </a:p>
@@ -8551,13 +8502,20 @@
     </p:spTree>
     <p:extLst>
       <p:ext uri="{BB962C8B-B14F-4D97-AF65-F5344CB8AC3E}">
-        <p14:creationId xmlns:p14="http://schemas.microsoft.com/office/powerpoint/2010/main" val="1344528664"/>
+        <p14:creationId xmlns:p14="http://schemas.microsoft.com/office/powerpoint/2010/main" val="1761208753"/>
       </p:ext>
     </p:extLst>
   </p:cSld>
   <p:clrMapOvr>
     <a:masterClrMapping/>
   </p:clrMapOvr>
+  <p:timing>
+    <p:tnLst>
+      <p:par>
+        <p:cTn id="1" dur="indefinite" restart="never" nodeType="tmRoot"/>
+      </p:par>
+    </p:tnLst>
+  </p:timing>
 </p:sld>
 </file>
 
@@ -8623,19 +8581,15 @@
           <a:p>
             <a:r>
               <a:rPr lang="en-US" dirty="0" smtClean="0"/>
-              <a:t>10 Hz, 3s window size, half-overlapping: </a:t>
+              <a:t>10 Hz, 2s window size, half-overlapping: </a:t>
             </a:r>
             <a:r>
               <a:rPr lang="en-US" b="1" dirty="0" smtClean="0"/>
-              <a:t>2875</a:t>
+              <a:t>4327</a:t>
             </a:r>
             <a:r>
               <a:rPr lang="en-US" dirty="0" smtClean="0"/>
-              <a:t> </a:t>
-            </a:r>
-            <a:r>
-              <a:rPr lang="en-US" dirty="0" smtClean="0"/>
-              <a:t>data points</a:t>
+              <a:t> data points</a:t>
             </a:r>
             <a:endParaRPr lang="en-US" dirty="0"/>
           </a:p>
@@ -8653,7 +8607,7 @@
           <p:nvPr>
             <p:extLst>
               <p:ext uri="{D42A27DB-BD31-4B8C-83A1-F6EECF244321}">
-                <p14:modId xmlns:p14="http://schemas.microsoft.com/office/powerpoint/2010/main" val="748806074"/>
+                <p14:modId xmlns:p14="http://schemas.microsoft.com/office/powerpoint/2010/main" val="1336355020"/>
               </p:ext>
             </p:extLst>
           </p:nvPr>
@@ -8759,7 +8713,7 @@
                       <a:pPr algn="ctr"/>
                       <a:r>
                         <a:rPr lang="en-US" sz="2400" dirty="0" smtClean="0"/>
-                        <a:t>192</a:t>
+                        <a:t>288</a:t>
                       </a:r>
                       <a:endParaRPr lang="en-US" sz="2400" dirty="0"/>
                     </a:p>
@@ -8788,7 +8742,7 @@
                       <a:pPr algn="ctr"/>
                       <a:r>
                         <a:rPr lang="en-US" sz="2400" dirty="0" smtClean="0"/>
-                        <a:t>172</a:t>
+                        <a:t>258</a:t>
                       </a:r>
                       <a:endParaRPr lang="en-US" sz="2400" dirty="0"/>
                     </a:p>
@@ -8819,7 +8773,7 @@
                       <a:pPr algn="ctr"/>
                       <a:r>
                         <a:rPr lang="en-US" sz="2400" dirty="0" smtClean="0"/>
-                        <a:t>222</a:t>
+                        <a:t>336</a:t>
                       </a:r>
                       <a:endParaRPr lang="en-US" sz="2400" dirty="0"/>
                     </a:p>
@@ -8852,7 +8806,7 @@
                       <a:pPr algn="ctr"/>
                       <a:r>
                         <a:rPr lang="en-US" sz="2400" dirty="0" smtClean="0"/>
-                        <a:t>192</a:t>
+                        <a:t>289</a:t>
                       </a:r>
                       <a:endParaRPr lang="en-US" sz="2400" dirty="0"/>
                     </a:p>
@@ -8883,7 +8837,7 @@
                       <a:pPr algn="ctr"/>
                       <a:r>
                         <a:rPr lang="en-US" sz="2400" dirty="0" smtClean="0"/>
-                        <a:t>172</a:t>
+                        <a:t>258</a:t>
                       </a:r>
                       <a:endParaRPr lang="en-US" sz="2400" dirty="0"/>
                     </a:p>
@@ -8912,7 +8866,7 @@
                       <a:pPr algn="ctr"/>
                       <a:r>
                         <a:rPr lang="en-US" sz="2400" dirty="0" smtClean="0"/>
-                        <a:t>213</a:t>
+                        <a:t>324</a:t>
                       </a:r>
                       <a:endParaRPr lang="en-US" sz="2400" dirty="0"/>
                     </a:p>
@@ -8942,7 +8896,7 @@
                       <a:pPr algn="ctr"/>
                       <a:r>
                         <a:rPr lang="en-US" sz="2400" dirty="0" smtClean="0"/>
-                        <a:t>224</a:t>
+                        <a:t>336</a:t>
                       </a:r>
                       <a:endParaRPr lang="en-US" sz="2400" dirty="0"/>
                     </a:p>
@@ -8971,7 +8925,7 @@
                       <a:pPr algn="ctr"/>
                       <a:r>
                         <a:rPr lang="en-US" sz="2400" dirty="0" smtClean="0"/>
-                        <a:t>171</a:t>
+                        <a:t>257</a:t>
                       </a:r>
                       <a:endParaRPr lang="en-US" sz="2400" dirty="0"/>
                     </a:p>
@@ -9002,7 +8956,7 @@
                       <a:pPr algn="ctr"/>
                       <a:r>
                         <a:rPr lang="en-US" sz="2400" dirty="0" smtClean="0"/>
-                        <a:t>224</a:t>
+                        <a:t>336</a:t>
                       </a:r>
                       <a:endParaRPr lang="en-US" sz="2400" dirty="0"/>
                     </a:p>
@@ -9047,7 +9001,7 @@
                       <a:pPr algn="ctr"/>
                       <a:r>
                         <a:rPr lang="en-US" sz="2400" dirty="0" smtClean="0"/>
-                        <a:t>224</a:t>
+                        <a:t>336</a:t>
                       </a:r>
                       <a:endParaRPr lang="en-US" sz="2400" dirty="0"/>
                     </a:p>
@@ -9078,7 +9032,7 @@
                       <a:pPr algn="ctr"/>
                       <a:r>
                         <a:rPr lang="en-US" sz="2400" dirty="0" smtClean="0"/>
-                        <a:t>213</a:t>
+                        <a:t>321</a:t>
                       </a:r>
                       <a:endParaRPr lang="en-US" sz="2400" dirty="0"/>
                     </a:p>
@@ -9123,7 +9077,7 @@
                       <a:pPr algn="ctr"/>
                       <a:r>
                         <a:rPr lang="en-US" sz="2400" dirty="0" smtClean="0"/>
-                        <a:t>224</a:t>
+                        <a:t>336</a:t>
                       </a:r>
                       <a:endParaRPr lang="en-US" sz="2400" dirty="0"/>
                     </a:p>
@@ -9154,7 +9108,7 @@
                       <a:pPr algn="ctr"/>
                       <a:r>
                         <a:rPr lang="en-US" sz="2400" dirty="0" smtClean="0"/>
-                        <a:t>210</a:t>
+                        <a:t>318</a:t>
                       </a:r>
                       <a:endParaRPr lang="en-US" sz="2400" dirty="0"/>
                     </a:p>
@@ -9199,7 +9153,7 @@
                       <a:pPr algn="ctr"/>
                       <a:r>
                         <a:rPr lang="en-US" sz="2400" dirty="0" smtClean="0"/>
-                        <a:t>222</a:t>
+                        <a:t>334</a:t>
                       </a:r>
                       <a:endParaRPr lang="en-US" sz="2400" dirty="0"/>
                     </a:p>
@@ -9214,13 +9168,20 @@
     </p:spTree>
     <p:extLst>
       <p:ext uri="{BB962C8B-B14F-4D97-AF65-F5344CB8AC3E}">
-        <p14:creationId xmlns:p14="http://schemas.microsoft.com/office/powerpoint/2010/main" val="1197536414"/>
+        <p14:creationId xmlns:p14="http://schemas.microsoft.com/office/powerpoint/2010/main" val="1344528664"/>
       </p:ext>
     </p:extLst>
   </p:cSld>
   <p:clrMapOvr>
     <a:masterClrMapping/>
   </p:clrMapOvr>
+  <p:timing>
+    <p:tnLst>
+      <p:par>
+        <p:cTn id="1" dur="indefinite" restart="never" nodeType="tmRoot"/>
+      </p:par>
+    </p:tnLst>
+  </p:timing>
 </p:sld>
 </file>
 
@@ -9251,14 +9212,19 @@
             <p:ph type="title"/>
           </p:nvPr>
         </p:nvSpPr>
-        <p:spPr/>
+        <p:spPr>
+          <a:xfrm>
+            <a:off x="838200" y="534987"/>
+            <a:ext cx="10515600" cy="1325563"/>
+          </a:xfrm>
+        </p:spPr>
         <p:txBody>
           <a:bodyPr/>
           <a:lstStyle/>
           <a:p>
             <a:r>
               <a:rPr lang="en-US" b="1" dirty="0" smtClean="0"/>
-              <a:t>Results</a:t>
+              <a:t>Data Summary</a:t>
             </a:r>
             <a:endParaRPr lang="en-US" b="1" dirty="0"/>
           </a:p>
@@ -9280,45 +9246,608 @@
           <a:lstStyle/>
           <a:p>
             <a:r>
-              <a:rPr lang="en-US" sz="3200" b="1" dirty="0" smtClean="0"/>
-              <a:t>Experiments </a:t>
-            </a:r>
-            <a:r>
-              <a:rPr lang="en-US" sz="3200" b="1" dirty="0" smtClean="0"/>
-              <a:t>(5-folds, 70-30 train-test split ratio):</a:t>
-            </a:r>
-          </a:p>
-          <a:p>
-            <a:pPr lvl="1"/>
-            <a:r>
-              <a:rPr lang="en-US" sz="2800" dirty="0" smtClean="0"/>
-              <a:t>SVM</a:t>
-            </a:r>
-          </a:p>
-          <a:p>
-            <a:pPr lvl="1"/>
-            <a:r>
-              <a:rPr lang="en-US" sz="2800" dirty="0" smtClean="0"/>
-              <a:t>Random </a:t>
-            </a:r>
-            <a:r>
-              <a:rPr lang="en-US" sz="2800" dirty="0" smtClean="0"/>
-              <a:t>Forest</a:t>
-            </a:r>
-            <a:endParaRPr lang="en-US" sz="2800" dirty="0" smtClean="0"/>
-          </a:p>
-        </p:txBody>
-      </p:sp>
+              <a:rPr lang="en-US" dirty="0" smtClean="0"/>
+              <a:t>10 Hz, 3s window size, half-overlapping: </a:t>
+            </a:r>
+            <a:r>
+              <a:rPr lang="en-US" b="1" dirty="0" smtClean="0"/>
+              <a:t>2875</a:t>
+            </a:r>
+            <a:r>
+              <a:rPr lang="en-US" dirty="0" smtClean="0"/>
+              <a:t> data points</a:t>
+            </a:r>
+            <a:endParaRPr lang="en-US" dirty="0"/>
+          </a:p>
+          <a:p>
+            <a:endParaRPr lang="en-US" dirty="0" smtClean="0"/>
+          </a:p>
+        </p:txBody>
+      </p:sp>
+      <p:graphicFrame>
+        <p:nvGraphicFramePr>
+          <p:cNvPr id="5" name="Content Placeholder 3"/>
+          <p:cNvGraphicFramePr>
+            <a:graphicFrameLocks/>
+          </p:cNvGraphicFramePr>
+          <p:nvPr>
+            <p:extLst>
+              <p:ext uri="{D42A27DB-BD31-4B8C-83A1-F6EECF244321}">
+                <p14:modId xmlns:p14="http://schemas.microsoft.com/office/powerpoint/2010/main" val="748806074"/>
+              </p:ext>
+            </p:extLst>
+          </p:nvPr>
+        </p:nvGraphicFramePr>
+        <p:xfrm>
+          <a:off x="504825" y="2497668"/>
+          <a:ext cx="11182349" cy="3814232"/>
+        </p:xfrm>
+        <a:graphic>
+          <a:graphicData uri="http://schemas.openxmlformats.org/drawingml/2006/table">
+            <a:tbl>
+              <a:tblPr firstRow="1" bandRow="1">
+                <a:tableStyleId>{5C22544A-7EE6-4342-B048-85BDC9FD1C3A}</a:tableStyleId>
+              </a:tblPr>
+              <a:tblGrid>
+                <a:gridCol w="2714625"/>
+                <a:gridCol w="2174198"/>
+                <a:gridCol w="3769402"/>
+                <a:gridCol w="2524124"/>
+              </a:tblGrid>
+              <a:tr h="476779">
+                <a:tc>
+                  <a:txBody>
+                    <a:bodyPr/>
+                    <a:lstStyle/>
+                    <a:p>
+                      <a:pPr algn="ctr"/>
+                      <a:r>
+                        <a:rPr lang="en-US" sz="2400" b="1" dirty="0" smtClean="0"/>
+                        <a:t>Activities</a:t>
+                      </a:r>
+                      <a:endParaRPr lang="en-US" sz="2400" b="1" dirty="0"/>
+                    </a:p>
+                  </a:txBody>
+                  <a:tcPr/>
+                </a:tc>
+                <a:tc>
+                  <a:txBody>
+                    <a:bodyPr/>
+                    <a:lstStyle/>
+                    <a:p>
+                      <a:pPr algn="ctr"/>
+                      <a:r>
+                        <a:rPr lang="en-US" sz="2400" b="1" baseline="0" dirty="0" smtClean="0"/>
+                        <a:t>Data Points</a:t>
+                      </a:r>
+                      <a:endParaRPr lang="en-US" sz="2400" b="1" dirty="0"/>
+                    </a:p>
+                  </a:txBody>
+                  <a:tcPr/>
+                </a:tc>
+                <a:tc>
+                  <a:txBody>
+                    <a:bodyPr/>
+                    <a:lstStyle/>
+                    <a:p>
+                      <a:pPr algn="ctr"/>
+                      <a:r>
+                        <a:rPr lang="en-US" sz="2400" b="1" dirty="0" smtClean="0"/>
+                        <a:t>Activities</a:t>
+                      </a:r>
+                      <a:endParaRPr lang="en-US" sz="2400" b="1" dirty="0"/>
+                    </a:p>
+                  </a:txBody>
+                  <a:tcPr/>
+                </a:tc>
+                <a:tc>
+                  <a:txBody>
+                    <a:bodyPr/>
+                    <a:lstStyle/>
+                    <a:p>
+                      <a:pPr algn="ctr"/>
+                      <a:r>
+                        <a:rPr lang="en-US" sz="2400" b="1" dirty="0" smtClean="0"/>
+                        <a:t>Duration</a:t>
+                      </a:r>
+                      <a:endParaRPr lang="en-US" sz="2400" b="1" dirty="0"/>
+                    </a:p>
+                  </a:txBody>
+                  <a:tcPr/>
+                </a:tc>
+              </a:tr>
+              <a:tr h="476779">
+                <a:tc>
+                  <a:txBody>
+                    <a:bodyPr/>
+                    <a:lstStyle/>
+                    <a:p>
+                      <a:r>
+                        <a:rPr lang="en-US" sz="2400" b="1" dirty="0" smtClean="0"/>
+                        <a:t>Walking</a:t>
+                      </a:r>
+                      <a:endParaRPr lang="en-US" sz="2400" b="1" dirty="0"/>
+                    </a:p>
+                  </a:txBody>
+                  <a:tcPr/>
+                </a:tc>
+                <a:tc>
+                  <a:txBody>
+                    <a:bodyPr/>
+                    <a:lstStyle/>
+                    <a:p>
+                      <a:pPr algn="ctr"/>
+                      <a:r>
+                        <a:rPr lang="en-US" sz="2400" dirty="0" smtClean="0"/>
+                        <a:t>192</a:t>
+                      </a:r>
+                      <a:endParaRPr lang="en-US" sz="2400" dirty="0"/>
+                    </a:p>
+                  </a:txBody>
+                  <a:tcPr/>
+                </a:tc>
+                <a:tc>
+                  <a:txBody>
+                    <a:bodyPr/>
+                    <a:lstStyle/>
+                    <a:p>
+                      <a:r>
+                        <a:rPr lang="en-US" sz="2400" b="1" dirty="0" smtClean="0"/>
+                        <a:t>Typing (keyboard, sitting)</a:t>
+                      </a:r>
+                      <a:endParaRPr lang="en-US" sz="2400" b="1" dirty="0"/>
+                    </a:p>
+                  </a:txBody>
+                  <a:tcPr/>
+                </a:tc>
+                <a:tc>
+                  <a:txBody>
+                    <a:bodyPr/>
+                    <a:lstStyle/>
+                    <a:p>
+                      <a:pPr algn="ctr"/>
+                      <a:r>
+                        <a:rPr lang="en-US" sz="2400" dirty="0" smtClean="0"/>
+                        <a:t>172</a:t>
+                      </a:r>
+                      <a:endParaRPr lang="en-US" sz="2400" dirty="0"/>
+                    </a:p>
+                  </a:txBody>
+                  <a:tcPr/>
+                </a:tc>
+              </a:tr>
+              <a:tr h="476779">
+                <a:tc>
+                  <a:txBody>
+                    <a:bodyPr/>
+                    <a:lstStyle/>
+                    <a:p>
+                      <a:r>
+                        <a:rPr lang="en-US" sz="2400" b="1" dirty="0" smtClean="0"/>
+                        <a:t>Running</a:t>
+                      </a:r>
+                      <a:endParaRPr lang="en-US" sz="2400" b="1" dirty="0"/>
+                    </a:p>
+                  </a:txBody>
+                  <a:tcPr/>
+                </a:tc>
+                <a:tc>
+                  <a:txBody>
+                    <a:bodyPr/>
+                    <a:lstStyle/>
+                    <a:p>
+                      <a:pPr algn="ctr"/>
+                      <a:r>
+                        <a:rPr lang="en-US" sz="2400" dirty="0" smtClean="0"/>
+                        <a:t>222</a:t>
+                      </a:r>
+                      <a:endParaRPr lang="en-US" sz="2400" dirty="0"/>
+                    </a:p>
+                  </a:txBody>
+                  <a:tcPr/>
+                </a:tc>
+                <a:tc>
+                  <a:txBody>
+                    <a:bodyPr/>
+                    <a:lstStyle/>
+                    <a:p>
+                      <a:r>
+                        <a:rPr lang="en-US" sz="2400" b="1" dirty="0" smtClean="0"/>
+                        <a:t>Writing (pencil,</a:t>
+                      </a:r>
+                      <a:r>
+                        <a:rPr lang="en-US" sz="2400" b="1" baseline="0" dirty="0" smtClean="0"/>
+                        <a:t> sitting)</a:t>
+                      </a:r>
+                      <a:endParaRPr lang="en-US" sz="2400" b="1" dirty="0"/>
+                    </a:p>
+                  </a:txBody>
+                  <a:tcPr/>
+                </a:tc>
+                <a:tc>
+                  <a:txBody>
+                    <a:bodyPr/>
+                    <a:lstStyle/>
+                    <a:p>
+                      <a:pPr algn="ctr"/>
+                      <a:r>
+                        <a:rPr lang="en-US" sz="2400" dirty="0" smtClean="0"/>
+                        <a:t>192</a:t>
+                      </a:r>
+                      <a:endParaRPr lang="en-US" sz="2400" dirty="0"/>
+                    </a:p>
+                  </a:txBody>
+                  <a:tcPr/>
+                </a:tc>
+              </a:tr>
+              <a:tr h="476779">
+                <a:tc>
+                  <a:txBody>
+                    <a:bodyPr/>
+                    <a:lstStyle/>
+                    <a:p>
+                      <a:r>
+                        <a:rPr lang="en-US" sz="2400" b="1" dirty="0" smtClean="0"/>
+                        <a:t>Lying</a:t>
+                      </a:r>
+                      <a:endParaRPr lang="en-US" sz="2400" b="1" dirty="0"/>
+                    </a:p>
+                  </a:txBody>
+                  <a:tcPr/>
+                </a:tc>
+                <a:tc>
+                  <a:txBody>
+                    <a:bodyPr/>
+                    <a:lstStyle/>
+                    <a:p>
+                      <a:pPr algn="ctr"/>
+                      <a:r>
+                        <a:rPr lang="en-US" sz="2400" dirty="0" smtClean="0"/>
+                        <a:t>172</a:t>
+                      </a:r>
+                      <a:endParaRPr lang="en-US" sz="2400" dirty="0"/>
+                    </a:p>
+                  </a:txBody>
+                  <a:tcPr/>
+                </a:tc>
+                <a:tc>
+                  <a:txBody>
+                    <a:bodyPr/>
+                    <a:lstStyle/>
+                    <a:p>
+                      <a:r>
+                        <a:rPr lang="en-US" sz="2400" b="1" dirty="0" smtClean="0"/>
+                        <a:t>Reading (book, sitting)</a:t>
+                      </a:r>
+                      <a:endParaRPr lang="en-US" sz="2400" b="1" dirty="0"/>
+                    </a:p>
+                  </a:txBody>
+                  <a:tcPr/>
+                </a:tc>
+                <a:tc>
+                  <a:txBody>
+                    <a:bodyPr/>
+                    <a:lstStyle/>
+                    <a:p>
+                      <a:pPr algn="ctr"/>
+                      <a:r>
+                        <a:rPr lang="en-US" sz="2400" dirty="0" smtClean="0"/>
+                        <a:t>213</a:t>
+                      </a:r>
+                      <a:endParaRPr lang="en-US" sz="2400" dirty="0"/>
+                    </a:p>
+                  </a:txBody>
+                  <a:tcPr/>
+                </a:tc>
+              </a:tr>
+              <a:tr h="476779">
+                <a:tc>
+                  <a:txBody>
+                    <a:bodyPr/>
+                    <a:lstStyle/>
+                    <a:p>
+                      <a:r>
+                        <a:rPr lang="en-US" sz="2400" b="1" dirty="0" smtClean="0"/>
+                        <a:t>Sitting</a:t>
+                      </a:r>
+                    </a:p>
+                  </a:txBody>
+                  <a:tcPr/>
+                </a:tc>
+                <a:tc>
+                  <a:txBody>
+                    <a:bodyPr/>
+                    <a:lstStyle/>
+                    <a:p>
+                      <a:pPr algn="ctr"/>
+                      <a:r>
+                        <a:rPr lang="en-US" sz="2400" dirty="0" smtClean="0"/>
+                        <a:t>224</a:t>
+                      </a:r>
+                      <a:endParaRPr lang="en-US" sz="2400" dirty="0"/>
+                    </a:p>
+                  </a:txBody>
+                  <a:tcPr/>
+                </a:tc>
+                <a:tc>
+                  <a:txBody>
+                    <a:bodyPr/>
+                    <a:lstStyle/>
+                    <a:p>
+                      <a:r>
+                        <a:rPr lang="en-US" sz="2400" b="1" dirty="0" smtClean="0"/>
+                        <a:t>Eating (sitting)</a:t>
+                      </a:r>
+                      <a:endParaRPr lang="en-US" sz="2400" b="1" dirty="0"/>
+                    </a:p>
+                  </a:txBody>
+                  <a:tcPr/>
+                </a:tc>
+                <a:tc>
+                  <a:txBody>
+                    <a:bodyPr/>
+                    <a:lstStyle/>
+                    <a:p>
+                      <a:pPr algn="ctr"/>
+                      <a:r>
+                        <a:rPr lang="en-US" sz="2400" dirty="0" smtClean="0"/>
+                        <a:t>171</a:t>
+                      </a:r>
+                      <a:endParaRPr lang="en-US" sz="2400" dirty="0"/>
+                    </a:p>
+                  </a:txBody>
+                  <a:tcPr/>
+                </a:tc>
+              </a:tr>
+              <a:tr h="476779">
+                <a:tc>
+                  <a:txBody>
+                    <a:bodyPr/>
+                    <a:lstStyle/>
+                    <a:p>
+                      <a:r>
+                        <a:rPr lang="en-US" sz="2400" b="1" dirty="0" smtClean="0"/>
+                        <a:t>Standing</a:t>
+                      </a:r>
+                      <a:endParaRPr lang="en-US" sz="2400" b="1" dirty="0"/>
+                    </a:p>
+                  </a:txBody>
+                  <a:tcPr/>
+                </a:tc>
+                <a:tc>
+                  <a:txBody>
+                    <a:bodyPr/>
+                    <a:lstStyle/>
+                    <a:p>
+                      <a:pPr algn="ctr"/>
+                      <a:r>
+                        <a:rPr lang="en-US" sz="2400" dirty="0" smtClean="0"/>
+                        <a:t>224</a:t>
+                      </a:r>
+                      <a:endParaRPr lang="en-US" sz="2400" dirty="0"/>
+                    </a:p>
+                  </a:txBody>
+                  <a:tcPr/>
+                </a:tc>
+                <a:tc>
+                  <a:txBody>
+                    <a:bodyPr/>
+                    <a:lstStyle/>
+                    <a:p>
+                      <a:pPr marL="0" marR="0" indent="0" algn="l" defTabSz="914400" rtl="0" eaLnBrk="1" fontAlgn="auto" latinLnBrk="0" hangingPunct="1">
+                        <a:lnSpc>
+                          <a:spcPct val="100000"/>
+                        </a:lnSpc>
+                        <a:spcBef>
+                          <a:spcPts val="0"/>
+                        </a:spcBef>
+                        <a:spcAft>
+                          <a:spcPts val="0"/>
+                        </a:spcAft>
+                        <a:buClrTx/>
+                        <a:buSzTx/>
+                        <a:buFontTx/>
+                        <a:buNone/>
+                        <a:tabLst/>
+                        <a:defRPr/>
+                      </a:pPr>
+                      <a:r>
+                        <a:rPr lang="en-US" sz="2400" b="1" dirty="0" smtClean="0"/>
+                        <a:t>Folding (clothes, standing)</a:t>
+                      </a:r>
+                    </a:p>
+                  </a:txBody>
+                  <a:tcPr/>
+                </a:tc>
+                <a:tc>
+                  <a:txBody>
+                    <a:bodyPr/>
+                    <a:lstStyle/>
+                    <a:p>
+                      <a:pPr algn="ctr"/>
+                      <a:r>
+                        <a:rPr lang="en-US" sz="2400" dirty="0" smtClean="0"/>
+                        <a:t>224</a:t>
+                      </a:r>
+                      <a:endParaRPr lang="en-US" sz="2400" dirty="0"/>
+                    </a:p>
+                  </a:txBody>
+                  <a:tcPr/>
+                </a:tc>
+              </a:tr>
+              <a:tr h="476779">
+                <a:tc>
+                  <a:txBody>
+                    <a:bodyPr/>
+                    <a:lstStyle/>
+                    <a:p>
+                      <a:r>
+                        <a:rPr lang="en-US" sz="2400" b="1" dirty="0" smtClean="0"/>
+                        <a:t>Going Upstairs</a:t>
+                      </a:r>
+                      <a:endParaRPr lang="en-US" sz="2400" b="1" dirty="0"/>
+                    </a:p>
+                  </a:txBody>
+                  <a:tcPr/>
+                </a:tc>
+                <a:tc>
+                  <a:txBody>
+                    <a:bodyPr/>
+                    <a:lstStyle/>
+                    <a:p>
+                      <a:pPr algn="ctr"/>
+                      <a:r>
+                        <a:rPr lang="en-US" sz="2400" dirty="0" smtClean="0"/>
+                        <a:t>213</a:t>
+                      </a:r>
+                      <a:endParaRPr lang="en-US" sz="2400" dirty="0"/>
+                    </a:p>
+                  </a:txBody>
+                  <a:tcPr/>
+                </a:tc>
+                <a:tc>
+                  <a:txBody>
+                    <a:bodyPr/>
+                    <a:lstStyle/>
+                    <a:p>
+                      <a:pPr marL="0" marR="0" indent="0" algn="l" defTabSz="914400" rtl="0" eaLnBrk="1" fontAlgn="auto" latinLnBrk="0" hangingPunct="1">
+                        <a:lnSpc>
+                          <a:spcPct val="100000"/>
+                        </a:lnSpc>
+                        <a:spcBef>
+                          <a:spcPts val="0"/>
+                        </a:spcBef>
+                        <a:spcAft>
+                          <a:spcPts val="0"/>
+                        </a:spcAft>
+                        <a:buClrTx/>
+                        <a:buSzTx/>
+                        <a:buFontTx/>
+                        <a:buNone/>
+                        <a:tabLst/>
+                        <a:defRPr/>
+                      </a:pPr>
+                      <a:r>
+                        <a:rPr lang="en-US" sz="2400" b="1" dirty="0" smtClean="0"/>
+                        <a:t>Sweeping the Floor</a:t>
+                      </a:r>
+                    </a:p>
+                  </a:txBody>
+                  <a:tcPr/>
+                </a:tc>
+                <a:tc>
+                  <a:txBody>
+                    <a:bodyPr/>
+                    <a:lstStyle/>
+                    <a:p>
+                      <a:pPr algn="ctr"/>
+                      <a:r>
+                        <a:rPr lang="en-US" sz="2400" dirty="0" smtClean="0"/>
+                        <a:t>224</a:t>
+                      </a:r>
+                      <a:endParaRPr lang="en-US" sz="2400" dirty="0"/>
+                    </a:p>
+                  </a:txBody>
+                  <a:tcPr/>
+                </a:tc>
+              </a:tr>
+              <a:tr h="476779">
+                <a:tc>
+                  <a:txBody>
+                    <a:bodyPr/>
+                    <a:lstStyle/>
+                    <a:p>
+                      <a:r>
+                        <a:rPr lang="en-US" sz="2400" b="1" dirty="0" smtClean="0"/>
+                        <a:t>Going Downstairs</a:t>
+                      </a:r>
+                      <a:endParaRPr lang="en-US" sz="2400" b="1" dirty="0"/>
+                    </a:p>
+                  </a:txBody>
+                  <a:tcPr/>
+                </a:tc>
+                <a:tc>
+                  <a:txBody>
+                    <a:bodyPr/>
+                    <a:lstStyle/>
+                    <a:p>
+                      <a:pPr algn="ctr"/>
+                      <a:r>
+                        <a:rPr lang="en-US" sz="2400" dirty="0" smtClean="0"/>
+                        <a:t>210</a:t>
+                      </a:r>
+                      <a:endParaRPr lang="en-US" sz="2400" dirty="0"/>
+                    </a:p>
+                  </a:txBody>
+                  <a:tcPr/>
+                </a:tc>
+                <a:tc>
+                  <a:txBody>
+                    <a:bodyPr/>
+                    <a:lstStyle/>
+                    <a:p>
+                      <a:pPr marL="0" marR="0" indent="0" algn="l" defTabSz="914400" rtl="0" eaLnBrk="1" fontAlgn="auto" latinLnBrk="0" hangingPunct="1">
+                        <a:lnSpc>
+                          <a:spcPct val="100000"/>
+                        </a:lnSpc>
+                        <a:spcBef>
+                          <a:spcPts val="0"/>
+                        </a:spcBef>
+                        <a:spcAft>
+                          <a:spcPts val="0"/>
+                        </a:spcAft>
+                        <a:buClrTx/>
+                        <a:buSzTx/>
+                        <a:buFontTx/>
+                        <a:buNone/>
+                        <a:tabLst/>
+                        <a:defRPr/>
+                      </a:pPr>
+                      <a:r>
+                        <a:rPr lang="en-US" sz="2400" b="1" dirty="0" smtClean="0"/>
+                        <a:t>Brushing (standing)</a:t>
+                      </a:r>
+                    </a:p>
+                  </a:txBody>
+                  <a:tcPr/>
+                </a:tc>
+                <a:tc>
+                  <a:txBody>
+                    <a:bodyPr/>
+                    <a:lstStyle/>
+                    <a:p>
+                      <a:pPr algn="ctr"/>
+                      <a:r>
+                        <a:rPr lang="en-US" sz="2400" dirty="0" smtClean="0"/>
+                        <a:t>222</a:t>
+                      </a:r>
+                      <a:endParaRPr lang="en-US" sz="2400" dirty="0"/>
+                    </a:p>
+                  </a:txBody>
+                  <a:tcPr/>
+                </a:tc>
+              </a:tr>
+            </a:tbl>
+          </a:graphicData>
+        </a:graphic>
+      </p:graphicFrame>
     </p:spTree>
     <p:extLst>
       <p:ext uri="{BB962C8B-B14F-4D97-AF65-F5344CB8AC3E}">
-        <p14:creationId xmlns:p14="http://schemas.microsoft.com/office/powerpoint/2010/main" val="1236445860"/>
+        <p14:creationId xmlns:p14="http://schemas.microsoft.com/office/powerpoint/2010/main" val="1197536414"/>
       </p:ext>
     </p:extLst>
   </p:cSld>
   <p:clrMapOvr>
     <a:masterClrMapping/>
   </p:clrMapOvr>
+  <p:timing>
+    <p:tnLst>
+      <p:par>
+        <p:cTn id="1" dur="indefinite" restart="never" nodeType="tmRoot"/>
+      </p:par>
+    </p:tnLst>
+  </p:timing>
 </p:sld>
 </file>
 

</xml_diff>